<commit_message>
Renamed gamepad controller in specs for consistency
</commit_message>
<xml_diff>
--- a/Specification/Editable source images/Images Spec Part 2 - Architecture and buses.pptx
+++ b/Specification/Editable source images/Images Spec Part 2 - Architecture and buses.pptx
@@ -110,7 +110,7 @@
   </p:defaultTextStyle>
   <p:extLst>
     <p:ext uri="{EFAFB233-063F-42B5-8137-9DF3F51BA10A}">
-      <p15:sldGuideLst xmlns:p15="http://schemas.microsoft.com/office/powerpoint/2012/main" xmlns="">
+      <p15:sldGuideLst xmlns="" xmlns:p15="http://schemas.microsoft.com/office/powerpoint/2012/main">
         <p15:guide id="1" orient="horz" pos="2160">
           <p15:clr>
             <a:srgbClr val="A4A3A4"/>
@@ -149,7 +149,7 @@
           <p:cNvPr id="2" name="Título 1">
             <a:extLst>
               <a:ext uri="{FF2B5EF4-FFF2-40B4-BE49-F238E27FC236}">
-                <a16:creationId xmlns:a16="http://schemas.microsoft.com/office/drawing/2014/main" xmlns="" id="{E3B9DF4B-0C72-4846-9560-CA4C0EF12637}"/>
+                <a16:creationId xmlns="" xmlns:a16="http://schemas.microsoft.com/office/drawing/2014/main" id="{E3B9DF4B-0C72-4846-9560-CA4C0EF12637}"/>
               </a:ext>
             </a:extLst>
           </p:cNvPr>
@@ -186,7 +186,7 @@
           <p:cNvPr id="3" name="Subtítulo 2">
             <a:extLst>
               <a:ext uri="{FF2B5EF4-FFF2-40B4-BE49-F238E27FC236}">
-                <a16:creationId xmlns:a16="http://schemas.microsoft.com/office/drawing/2014/main" xmlns="" id="{685B1628-0B9C-4511-8020-749CB381CA8A}"/>
+                <a16:creationId xmlns="" xmlns:a16="http://schemas.microsoft.com/office/drawing/2014/main" id="{685B1628-0B9C-4511-8020-749CB381CA8A}"/>
               </a:ext>
             </a:extLst>
           </p:cNvPr>
@@ -256,7 +256,7 @@
           <p:cNvPr id="4" name="Marcador de fecha 3">
             <a:extLst>
               <a:ext uri="{FF2B5EF4-FFF2-40B4-BE49-F238E27FC236}">
-                <a16:creationId xmlns:a16="http://schemas.microsoft.com/office/drawing/2014/main" xmlns="" id="{94B80B3E-D487-4AED-BB83-C0CCE4C60C28}"/>
+                <a16:creationId xmlns="" xmlns:a16="http://schemas.microsoft.com/office/drawing/2014/main" id="{94B80B3E-D487-4AED-BB83-C0CCE4C60C28}"/>
               </a:ext>
             </a:extLst>
           </p:cNvPr>
@@ -275,7 +275,7 @@
             <a:fld id="{EFBC5A1B-75D9-4BC9-8C41-860857045191}" type="datetimeFigureOut">
               <a:rPr lang="es-ES" smtClean="0"/>
               <a:pPr/>
-              <a:t>20/11/2022</a:t>
+              <a:t>15/12/2022</a:t>
             </a:fld>
             <a:endParaRPr lang="es-ES"/>
           </a:p>
@@ -286,7 +286,7 @@
           <p:cNvPr id="5" name="Marcador de pie de página 4">
             <a:extLst>
               <a:ext uri="{FF2B5EF4-FFF2-40B4-BE49-F238E27FC236}">
-                <a16:creationId xmlns:a16="http://schemas.microsoft.com/office/drawing/2014/main" xmlns="" id="{4C360251-304A-4F05-98C3-0F4C6ACE97D7}"/>
+                <a16:creationId xmlns="" xmlns:a16="http://schemas.microsoft.com/office/drawing/2014/main" id="{4C360251-304A-4F05-98C3-0F4C6ACE97D7}"/>
               </a:ext>
             </a:extLst>
           </p:cNvPr>
@@ -311,7 +311,7 @@
           <p:cNvPr id="6" name="Marcador de número de diapositiva 5">
             <a:extLst>
               <a:ext uri="{FF2B5EF4-FFF2-40B4-BE49-F238E27FC236}">
-                <a16:creationId xmlns:a16="http://schemas.microsoft.com/office/drawing/2014/main" xmlns="" id="{6799EFD0-FF52-4DE6-868B-77F17D2F4FF0}"/>
+                <a16:creationId xmlns="" xmlns:a16="http://schemas.microsoft.com/office/drawing/2014/main" id="{6799EFD0-FF52-4DE6-868B-77F17D2F4FF0}"/>
               </a:ext>
             </a:extLst>
           </p:cNvPr>
@@ -339,7 +339,7 @@
     </p:spTree>
     <p:extLst>
       <p:ext uri="{BB962C8B-B14F-4D97-AF65-F5344CB8AC3E}">
-        <p14:creationId xmlns:p14="http://schemas.microsoft.com/office/powerpoint/2010/main" xmlns="" val="3630569971"/>
+        <p14:creationId xmlns="" xmlns:p14="http://schemas.microsoft.com/office/powerpoint/2010/main" val="3630569971"/>
       </p:ext>
     </p:extLst>
   </p:cSld>
@@ -371,7 +371,7 @@
           <p:cNvPr id="2" name="Título 1">
             <a:extLst>
               <a:ext uri="{FF2B5EF4-FFF2-40B4-BE49-F238E27FC236}">
-                <a16:creationId xmlns:a16="http://schemas.microsoft.com/office/drawing/2014/main" xmlns="" id="{0DC87140-B7D9-4FA4-A34F-FB77A3666A4F}"/>
+                <a16:creationId xmlns="" xmlns:a16="http://schemas.microsoft.com/office/drawing/2014/main" id="{0DC87140-B7D9-4FA4-A34F-FB77A3666A4F}"/>
               </a:ext>
             </a:extLst>
           </p:cNvPr>
@@ -399,7 +399,7 @@
           <p:cNvPr id="3" name="Marcador de texto vertical 2">
             <a:extLst>
               <a:ext uri="{FF2B5EF4-FFF2-40B4-BE49-F238E27FC236}">
-                <a16:creationId xmlns:a16="http://schemas.microsoft.com/office/drawing/2014/main" xmlns="" id="{850563DB-D0F8-4DBB-A77B-19BBDF9BDBCD}"/>
+                <a16:creationId xmlns="" xmlns:a16="http://schemas.microsoft.com/office/drawing/2014/main" id="{850563DB-D0F8-4DBB-A77B-19BBDF9BDBCD}"/>
               </a:ext>
             </a:extLst>
           </p:cNvPr>
@@ -456,7 +456,7 @@
           <p:cNvPr id="4" name="Marcador de fecha 3">
             <a:extLst>
               <a:ext uri="{FF2B5EF4-FFF2-40B4-BE49-F238E27FC236}">
-                <a16:creationId xmlns:a16="http://schemas.microsoft.com/office/drawing/2014/main" xmlns="" id="{F3F66AC4-DE53-4169-9771-B049F319EEA9}"/>
+                <a16:creationId xmlns="" xmlns:a16="http://schemas.microsoft.com/office/drawing/2014/main" id="{F3F66AC4-DE53-4169-9771-B049F319EEA9}"/>
               </a:ext>
             </a:extLst>
           </p:cNvPr>
@@ -475,7 +475,7 @@
             <a:fld id="{EFBC5A1B-75D9-4BC9-8C41-860857045191}" type="datetimeFigureOut">
               <a:rPr lang="es-ES" smtClean="0"/>
               <a:pPr/>
-              <a:t>20/11/2022</a:t>
+              <a:t>15/12/2022</a:t>
             </a:fld>
             <a:endParaRPr lang="es-ES"/>
           </a:p>
@@ -486,7 +486,7 @@
           <p:cNvPr id="5" name="Marcador de pie de página 4">
             <a:extLst>
               <a:ext uri="{FF2B5EF4-FFF2-40B4-BE49-F238E27FC236}">
-                <a16:creationId xmlns:a16="http://schemas.microsoft.com/office/drawing/2014/main" xmlns="" id="{7F1B4E51-E6DE-4608-865D-CC9B9B289FC7}"/>
+                <a16:creationId xmlns="" xmlns:a16="http://schemas.microsoft.com/office/drawing/2014/main" id="{7F1B4E51-E6DE-4608-865D-CC9B9B289FC7}"/>
               </a:ext>
             </a:extLst>
           </p:cNvPr>
@@ -511,7 +511,7 @@
           <p:cNvPr id="6" name="Marcador de número de diapositiva 5">
             <a:extLst>
               <a:ext uri="{FF2B5EF4-FFF2-40B4-BE49-F238E27FC236}">
-                <a16:creationId xmlns:a16="http://schemas.microsoft.com/office/drawing/2014/main" xmlns="" id="{AC49A7EA-BD2D-4D11-9E44-7FD8F2848414}"/>
+                <a16:creationId xmlns="" xmlns:a16="http://schemas.microsoft.com/office/drawing/2014/main" id="{AC49A7EA-BD2D-4D11-9E44-7FD8F2848414}"/>
               </a:ext>
             </a:extLst>
           </p:cNvPr>
@@ -539,7 +539,7 @@
     </p:spTree>
     <p:extLst>
       <p:ext uri="{BB962C8B-B14F-4D97-AF65-F5344CB8AC3E}">
-        <p14:creationId xmlns:p14="http://schemas.microsoft.com/office/powerpoint/2010/main" xmlns="" val="3667736171"/>
+        <p14:creationId xmlns="" xmlns:p14="http://schemas.microsoft.com/office/powerpoint/2010/main" val="3667736171"/>
       </p:ext>
     </p:extLst>
   </p:cSld>
@@ -571,7 +571,7 @@
           <p:cNvPr id="2" name="Título vertical 1">
             <a:extLst>
               <a:ext uri="{FF2B5EF4-FFF2-40B4-BE49-F238E27FC236}">
-                <a16:creationId xmlns:a16="http://schemas.microsoft.com/office/drawing/2014/main" xmlns="" id="{5B32CEA0-9850-4637-812E-6A3BA3FDCDE1}"/>
+                <a16:creationId xmlns="" xmlns:a16="http://schemas.microsoft.com/office/drawing/2014/main" id="{5B32CEA0-9850-4637-812E-6A3BA3FDCDE1}"/>
               </a:ext>
             </a:extLst>
           </p:cNvPr>
@@ -604,7 +604,7 @@
           <p:cNvPr id="3" name="Marcador de texto vertical 2">
             <a:extLst>
               <a:ext uri="{FF2B5EF4-FFF2-40B4-BE49-F238E27FC236}">
-                <a16:creationId xmlns:a16="http://schemas.microsoft.com/office/drawing/2014/main" xmlns="" id="{939BC441-ACB3-491E-BDDF-AAB44A6A9480}"/>
+                <a16:creationId xmlns="" xmlns:a16="http://schemas.microsoft.com/office/drawing/2014/main" id="{939BC441-ACB3-491E-BDDF-AAB44A6A9480}"/>
               </a:ext>
             </a:extLst>
           </p:cNvPr>
@@ -666,7 +666,7 @@
           <p:cNvPr id="4" name="Marcador de fecha 3">
             <a:extLst>
               <a:ext uri="{FF2B5EF4-FFF2-40B4-BE49-F238E27FC236}">
-                <a16:creationId xmlns:a16="http://schemas.microsoft.com/office/drawing/2014/main" xmlns="" id="{4E5F3364-5D05-4590-944A-B62A5881200D}"/>
+                <a16:creationId xmlns="" xmlns:a16="http://schemas.microsoft.com/office/drawing/2014/main" id="{4E5F3364-5D05-4590-944A-B62A5881200D}"/>
               </a:ext>
             </a:extLst>
           </p:cNvPr>
@@ -685,7 +685,7 @@
             <a:fld id="{EFBC5A1B-75D9-4BC9-8C41-860857045191}" type="datetimeFigureOut">
               <a:rPr lang="es-ES" smtClean="0"/>
               <a:pPr/>
-              <a:t>20/11/2022</a:t>
+              <a:t>15/12/2022</a:t>
             </a:fld>
             <a:endParaRPr lang="es-ES"/>
           </a:p>
@@ -696,7 +696,7 @@
           <p:cNvPr id="5" name="Marcador de pie de página 4">
             <a:extLst>
               <a:ext uri="{FF2B5EF4-FFF2-40B4-BE49-F238E27FC236}">
-                <a16:creationId xmlns:a16="http://schemas.microsoft.com/office/drawing/2014/main" xmlns="" id="{F6634A9D-820F-4C3B-AD07-AAB5383B1C30}"/>
+                <a16:creationId xmlns="" xmlns:a16="http://schemas.microsoft.com/office/drawing/2014/main" id="{F6634A9D-820F-4C3B-AD07-AAB5383B1C30}"/>
               </a:ext>
             </a:extLst>
           </p:cNvPr>
@@ -721,7 +721,7 @@
           <p:cNvPr id="6" name="Marcador de número de diapositiva 5">
             <a:extLst>
               <a:ext uri="{FF2B5EF4-FFF2-40B4-BE49-F238E27FC236}">
-                <a16:creationId xmlns:a16="http://schemas.microsoft.com/office/drawing/2014/main" xmlns="" id="{AF9F029D-3E88-4B7B-BB5B-24C24BC15CA7}"/>
+                <a16:creationId xmlns="" xmlns:a16="http://schemas.microsoft.com/office/drawing/2014/main" id="{AF9F029D-3E88-4B7B-BB5B-24C24BC15CA7}"/>
               </a:ext>
             </a:extLst>
           </p:cNvPr>
@@ -749,7 +749,7 @@
     </p:spTree>
     <p:extLst>
       <p:ext uri="{BB962C8B-B14F-4D97-AF65-F5344CB8AC3E}">
-        <p14:creationId xmlns:p14="http://schemas.microsoft.com/office/powerpoint/2010/main" xmlns="" val="3527137102"/>
+        <p14:creationId xmlns="" xmlns:p14="http://schemas.microsoft.com/office/powerpoint/2010/main" val="3527137102"/>
       </p:ext>
     </p:extLst>
   </p:cSld>
@@ -781,7 +781,7 @@
           <p:cNvPr id="2" name="Título 1">
             <a:extLst>
               <a:ext uri="{FF2B5EF4-FFF2-40B4-BE49-F238E27FC236}">
-                <a16:creationId xmlns:a16="http://schemas.microsoft.com/office/drawing/2014/main" xmlns="" id="{08950D71-BF45-4BBD-819C-49E969998269}"/>
+                <a16:creationId xmlns="" xmlns:a16="http://schemas.microsoft.com/office/drawing/2014/main" id="{08950D71-BF45-4BBD-819C-49E969998269}"/>
               </a:ext>
             </a:extLst>
           </p:cNvPr>
@@ -809,7 +809,7 @@
           <p:cNvPr id="3" name="Marcador de contenido 2">
             <a:extLst>
               <a:ext uri="{FF2B5EF4-FFF2-40B4-BE49-F238E27FC236}">
-                <a16:creationId xmlns:a16="http://schemas.microsoft.com/office/drawing/2014/main" xmlns="" id="{961FBA74-E944-406F-826A-2C37A64FD07F}"/>
+                <a16:creationId xmlns="" xmlns:a16="http://schemas.microsoft.com/office/drawing/2014/main" id="{961FBA74-E944-406F-826A-2C37A64FD07F}"/>
               </a:ext>
             </a:extLst>
           </p:cNvPr>
@@ -866,7 +866,7 @@
           <p:cNvPr id="4" name="Marcador de fecha 3">
             <a:extLst>
               <a:ext uri="{FF2B5EF4-FFF2-40B4-BE49-F238E27FC236}">
-                <a16:creationId xmlns:a16="http://schemas.microsoft.com/office/drawing/2014/main" xmlns="" id="{9BF5C59E-1E2B-45B4-9381-181FD109BDB3}"/>
+                <a16:creationId xmlns="" xmlns:a16="http://schemas.microsoft.com/office/drawing/2014/main" id="{9BF5C59E-1E2B-45B4-9381-181FD109BDB3}"/>
               </a:ext>
             </a:extLst>
           </p:cNvPr>
@@ -885,7 +885,7 @@
             <a:fld id="{EFBC5A1B-75D9-4BC9-8C41-860857045191}" type="datetimeFigureOut">
               <a:rPr lang="es-ES" smtClean="0"/>
               <a:pPr/>
-              <a:t>20/11/2022</a:t>
+              <a:t>15/12/2022</a:t>
             </a:fld>
             <a:endParaRPr lang="es-ES"/>
           </a:p>
@@ -896,7 +896,7 @@
           <p:cNvPr id="5" name="Marcador de pie de página 4">
             <a:extLst>
               <a:ext uri="{FF2B5EF4-FFF2-40B4-BE49-F238E27FC236}">
-                <a16:creationId xmlns:a16="http://schemas.microsoft.com/office/drawing/2014/main" xmlns="" id="{A837392A-47E5-47F6-8C55-2267B7EEB618}"/>
+                <a16:creationId xmlns="" xmlns:a16="http://schemas.microsoft.com/office/drawing/2014/main" id="{A837392A-47E5-47F6-8C55-2267B7EEB618}"/>
               </a:ext>
             </a:extLst>
           </p:cNvPr>
@@ -921,7 +921,7 @@
           <p:cNvPr id="6" name="Marcador de número de diapositiva 5">
             <a:extLst>
               <a:ext uri="{FF2B5EF4-FFF2-40B4-BE49-F238E27FC236}">
-                <a16:creationId xmlns:a16="http://schemas.microsoft.com/office/drawing/2014/main" xmlns="" id="{2DAD3A73-252F-438F-9D6E-BFF97E283E0E}"/>
+                <a16:creationId xmlns="" xmlns:a16="http://schemas.microsoft.com/office/drawing/2014/main" id="{2DAD3A73-252F-438F-9D6E-BFF97E283E0E}"/>
               </a:ext>
             </a:extLst>
           </p:cNvPr>
@@ -949,7 +949,7 @@
     </p:spTree>
     <p:extLst>
       <p:ext uri="{BB962C8B-B14F-4D97-AF65-F5344CB8AC3E}">
-        <p14:creationId xmlns:p14="http://schemas.microsoft.com/office/powerpoint/2010/main" xmlns="" val="3101532947"/>
+        <p14:creationId xmlns="" xmlns:p14="http://schemas.microsoft.com/office/powerpoint/2010/main" val="3101532947"/>
       </p:ext>
     </p:extLst>
   </p:cSld>
@@ -981,7 +981,7 @@
           <p:cNvPr id="2" name="Título 1">
             <a:extLst>
               <a:ext uri="{FF2B5EF4-FFF2-40B4-BE49-F238E27FC236}">
-                <a16:creationId xmlns:a16="http://schemas.microsoft.com/office/drawing/2014/main" xmlns="" id="{D95F49E8-9F51-4C29-B594-41EFB07B151D}"/>
+                <a16:creationId xmlns="" xmlns:a16="http://schemas.microsoft.com/office/drawing/2014/main" id="{D95F49E8-9F51-4C29-B594-41EFB07B151D}"/>
               </a:ext>
             </a:extLst>
           </p:cNvPr>
@@ -1018,7 +1018,7 @@
           <p:cNvPr id="3" name="Marcador de texto 2">
             <a:extLst>
               <a:ext uri="{FF2B5EF4-FFF2-40B4-BE49-F238E27FC236}">
-                <a16:creationId xmlns:a16="http://schemas.microsoft.com/office/drawing/2014/main" xmlns="" id="{14212A7B-BB3F-43D7-BB50-5C778BF31233}"/>
+                <a16:creationId xmlns="" xmlns:a16="http://schemas.microsoft.com/office/drawing/2014/main" id="{14212A7B-BB3F-43D7-BB50-5C778BF31233}"/>
               </a:ext>
             </a:extLst>
           </p:cNvPr>
@@ -1143,7 +1143,7 @@
           <p:cNvPr id="4" name="Marcador de fecha 3">
             <a:extLst>
               <a:ext uri="{FF2B5EF4-FFF2-40B4-BE49-F238E27FC236}">
-                <a16:creationId xmlns:a16="http://schemas.microsoft.com/office/drawing/2014/main" xmlns="" id="{4D1F1240-5664-43E2-A8B7-3D42989C6517}"/>
+                <a16:creationId xmlns="" xmlns:a16="http://schemas.microsoft.com/office/drawing/2014/main" id="{4D1F1240-5664-43E2-A8B7-3D42989C6517}"/>
               </a:ext>
             </a:extLst>
           </p:cNvPr>
@@ -1162,7 +1162,7 @@
             <a:fld id="{EFBC5A1B-75D9-4BC9-8C41-860857045191}" type="datetimeFigureOut">
               <a:rPr lang="es-ES" smtClean="0"/>
               <a:pPr/>
-              <a:t>20/11/2022</a:t>
+              <a:t>15/12/2022</a:t>
             </a:fld>
             <a:endParaRPr lang="es-ES"/>
           </a:p>
@@ -1173,7 +1173,7 @@
           <p:cNvPr id="5" name="Marcador de pie de página 4">
             <a:extLst>
               <a:ext uri="{FF2B5EF4-FFF2-40B4-BE49-F238E27FC236}">
-                <a16:creationId xmlns:a16="http://schemas.microsoft.com/office/drawing/2014/main" xmlns="" id="{92038497-9614-49CA-BFAB-997CB1B236C1}"/>
+                <a16:creationId xmlns="" xmlns:a16="http://schemas.microsoft.com/office/drawing/2014/main" id="{92038497-9614-49CA-BFAB-997CB1B236C1}"/>
               </a:ext>
             </a:extLst>
           </p:cNvPr>
@@ -1198,7 +1198,7 @@
           <p:cNvPr id="6" name="Marcador de número de diapositiva 5">
             <a:extLst>
               <a:ext uri="{FF2B5EF4-FFF2-40B4-BE49-F238E27FC236}">
-                <a16:creationId xmlns:a16="http://schemas.microsoft.com/office/drawing/2014/main" xmlns="" id="{833C8CA2-40EC-4045-B0F5-731AF8AEEFD1}"/>
+                <a16:creationId xmlns="" xmlns:a16="http://schemas.microsoft.com/office/drawing/2014/main" id="{833C8CA2-40EC-4045-B0F5-731AF8AEEFD1}"/>
               </a:ext>
             </a:extLst>
           </p:cNvPr>
@@ -1226,7 +1226,7 @@
     </p:spTree>
     <p:extLst>
       <p:ext uri="{BB962C8B-B14F-4D97-AF65-F5344CB8AC3E}">
-        <p14:creationId xmlns:p14="http://schemas.microsoft.com/office/powerpoint/2010/main" xmlns="" val="3711361680"/>
+        <p14:creationId xmlns="" xmlns:p14="http://schemas.microsoft.com/office/powerpoint/2010/main" val="3711361680"/>
       </p:ext>
     </p:extLst>
   </p:cSld>
@@ -1258,7 +1258,7 @@
           <p:cNvPr id="2" name="Título 1">
             <a:extLst>
               <a:ext uri="{FF2B5EF4-FFF2-40B4-BE49-F238E27FC236}">
-                <a16:creationId xmlns:a16="http://schemas.microsoft.com/office/drawing/2014/main" xmlns="" id="{41A6C47D-FD4D-4D43-801F-330700505E61}"/>
+                <a16:creationId xmlns="" xmlns:a16="http://schemas.microsoft.com/office/drawing/2014/main" id="{41A6C47D-FD4D-4D43-801F-330700505E61}"/>
               </a:ext>
             </a:extLst>
           </p:cNvPr>
@@ -1286,7 +1286,7 @@
           <p:cNvPr id="3" name="Marcador de contenido 2">
             <a:extLst>
               <a:ext uri="{FF2B5EF4-FFF2-40B4-BE49-F238E27FC236}">
-                <a16:creationId xmlns:a16="http://schemas.microsoft.com/office/drawing/2014/main" xmlns="" id="{D281C82E-1633-42E6-B5C4-E8BF7CD2F9B4}"/>
+                <a16:creationId xmlns="" xmlns:a16="http://schemas.microsoft.com/office/drawing/2014/main" id="{D281C82E-1633-42E6-B5C4-E8BF7CD2F9B4}"/>
               </a:ext>
             </a:extLst>
           </p:cNvPr>
@@ -1348,7 +1348,7 @@
           <p:cNvPr id="4" name="Marcador de contenido 3">
             <a:extLst>
               <a:ext uri="{FF2B5EF4-FFF2-40B4-BE49-F238E27FC236}">
-                <a16:creationId xmlns:a16="http://schemas.microsoft.com/office/drawing/2014/main" xmlns="" id="{BCA14AFC-7189-41E3-BA37-BCF1815CF68C}"/>
+                <a16:creationId xmlns="" xmlns:a16="http://schemas.microsoft.com/office/drawing/2014/main" id="{BCA14AFC-7189-41E3-BA37-BCF1815CF68C}"/>
               </a:ext>
             </a:extLst>
           </p:cNvPr>
@@ -1410,7 +1410,7 @@
           <p:cNvPr id="5" name="Marcador de fecha 4">
             <a:extLst>
               <a:ext uri="{FF2B5EF4-FFF2-40B4-BE49-F238E27FC236}">
-                <a16:creationId xmlns:a16="http://schemas.microsoft.com/office/drawing/2014/main" xmlns="" id="{C9ABDD57-5E98-4A92-91B4-6445F2830FC3}"/>
+                <a16:creationId xmlns="" xmlns:a16="http://schemas.microsoft.com/office/drawing/2014/main" id="{C9ABDD57-5E98-4A92-91B4-6445F2830FC3}"/>
               </a:ext>
             </a:extLst>
           </p:cNvPr>
@@ -1429,7 +1429,7 @@
             <a:fld id="{EFBC5A1B-75D9-4BC9-8C41-860857045191}" type="datetimeFigureOut">
               <a:rPr lang="es-ES" smtClean="0"/>
               <a:pPr/>
-              <a:t>20/11/2022</a:t>
+              <a:t>15/12/2022</a:t>
             </a:fld>
             <a:endParaRPr lang="es-ES"/>
           </a:p>
@@ -1440,7 +1440,7 @@
           <p:cNvPr id="6" name="Marcador de pie de página 5">
             <a:extLst>
               <a:ext uri="{FF2B5EF4-FFF2-40B4-BE49-F238E27FC236}">
-                <a16:creationId xmlns:a16="http://schemas.microsoft.com/office/drawing/2014/main" xmlns="" id="{8BE8DE0D-8FE7-404D-82FA-81005C035303}"/>
+                <a16:creationId xmlns="" xmlns:a16="http://schemas.microsoft.com/office/drawing/2014/main" id="{8BE8DE0D-8FE7-404D-82FA-81005C035303}"/>
               </a:ext>
             </a:extLst>
           </p:cNvPr>
@@ -1465,7 +1465,7 @@
           <p:cNvPr id="7" name="Marcador de número de diapositiva 6">
             <a:extLst>
               <a:ext uri="{FF2B5EF4-FFF2-40B4-BE49-F238E27FC236}">
-                <a16:creationId xmlns:a16="http://schemas.microsoft.com/office/drawing/2014/main" xmlns="" id="{D89226D1-4424-4713-8FA0-A7E883DDCC6D}"/>
+                <a16:creationId xmlns="" xmlns:a16="http://schemas.microsoft.com/office/drawing/2014/main" id="{D89226D1-4424-4713-8FA0-A7E883DDCC6D}"/>
               </a:ext>
             </a:extLst>
           </p:cNvPr>
@@ -1493,7 +1493,7 @@
     </p:spTree>
     <p:extLst>
       <p:ext uri="{BB962C8B-B14F-4D97-AF65-F5344CB8AC3E}">
-        <p14:creationId xmlns:p14="http://schemas.microsoft.com/office/powerpoint/2010/main" xmlns="" val="2478964046"/>
+        <p14:creationId xmlns="" xmlns:p14="http://schemas.microsoft.com/office/powerpoint/2010/main" val="2478964046"/>
       </p:ext>
     </p:extLst>
   </p:cSld>
@@ -1525,7 +1525,7 @@
           <p:cNvPr id="2" name="Título 1">
             <a:extLst>
               <a:ext uri="{FF2B5EF4-FFF2-40B4-BE49-F238E27FC236}">
-                <a16:creationId xmlns:a16="http://schemas.microsoft.com/office/drawing/2014/main" xmlns="" id="{202F9D12-A55E-498F-94E5-6AA1DDDCC6AA}"/>
+                <a16:creationId xmlns="" xmlns:a16="http://schemas.microsoft.com/office/drawing/2014/main" id="{202F9D12-A55E-498F-94E5-6AA1DDDCC6AA}"/>
               </a:ext>
             </a:extLst>
           </p:cNvPr>
@@ -1558,7 +1558,7 @@
           <p:cNvPr id="3" name="Marcador de texto 2">
             <a:extLst>
               <a:ext uri="{FF2B5EF4-FFF2-40B4-BE49-F238E27FC236}">
-                <a16:creationId xmlns:a16="http://schemas.microsoft.com/office/drawing/2014/main" xmlns="" id="{F45F8F00-0AAE-4BCC-ACE0-EF39A7855793}"/>
+                <a16:creationId xmlns="" xmlns:a16="http://schemas.microsoft.com/office/drawing/2014/main" id="{F45F8F00-0AAE-4BCC-ACE0-EF39A7855793}"/>
               </a:ext>
             </a:extLst>
           </p:cNvPr>
@@ -1629,7 +1629,7 @@
           <p:cNvPr id="4" name="Marcador de contenido 3">
             <a:extLst>
               <a:ext uri="{FF2B5EF4-FFF2-40B4-BE49-F238E27FC236}">
-                <a16:creationId xmlns:a16="http://schemas.microsoft.com/office/drawing/2014/main" xmlns="" id="{480D2540-C401-4457-A666-27A2FE07A1EB}"/>
+                <a16:creationId xmlns="" xmlns:a16="http://schemas.microsoft.com/office/drawing/2014/main" id="{480D2540-C401-4457-A666-27A2FE07A1EB}"/>
               </a:ext>
             </a:extLst>
           </p:cNvPr>
@@ -1691,7 +1691,7 @@
           <p:cNvPr id="5" name="Marcador de texto 4">
             <a:extLst>
               <a:ext uri="{FF2B5EF4-FFF2-40B4-BE49-F238E27FC236}">
-                <a16:creationId xmlns:a16="http://schemas.microsoft.com/office/drawing/2014/main" xmlns="" id="{162F695D-A642-46C8-A831-1B43A3621DC9}"/>
+                <a16:creationId xmlns="" xmlns:a16="http://schemas.microsoft.com/office/drawing/2014/main" id="{162F695D-A642-46C8-A831-1B43A3621DC9}"/>
               </a:ext>
             </a:extLst>
           </p:cNvPr>
@@ -1762,7 +1762,7 @@
           <p:cNvPr id="6" name="Marcador de contenido 5">
             <a:extLst>
               <a:ext uri="{FF2B5EF4-FFF2-40B4-BE49-F238E27FC236}">
-                <a16:creationId xmlns:a16="http://schemas.microsoft.com/office/drawing/2014/main" xmlns="" id="{28899A86-5725-455F-94EE-5587484C3ADA}"/>
+                <a16:creationId xmlns="" xmlns:a16="http://schemas.microsoft.com/office/drawing/2014/main" id="{28899A86-5725-455F-94EE-5587484C3ADA}"/>
               </a:ext>
             </a:extLst>
           </p:cNvPr>
@@ -1824,7 +1824,7 @@
           <p:cNvPr id="7" name="Marcador de fecha 6">
             <a:extLst>
               <a:ext uri="{FF2B5EF4-FFF2-40B4-BE49-F238E27FC236}">
-                <a16:creationId xmlns:a16="http://schemas.microsoft.com/office/drawing/2014/main" xmlns="" id="{71554A8D-DBE0-4421-9267-7776721E8BE7}"/>
+                <a16:creationId xmlns="" xmlns:a16="http://schemas.microsoft.com/office/drawing/2014/main" id="{71554A8D-DBE0-4421-9267-7776721E8BE7}"/>
               </a:ext>
             </a:extLst>
           </p:cNvPr>
@@ -1843,7 +1843,7 @@
             <a:fld id="{EFBC5A1B-75D9-4BC9-8C41-860857045191}" type="datetimeFigureOut">
               <a:rPr lang="es-ES" smtClean="0"/>
               <a:pPr/>
-              <a:t>20/11/2022</a:t>
+              <a:t>15/12/2022</a:t>
             </a:fld>
             <a:endParaRPr lang="es-ES"/>
           </a:p>
@@ -1854,7 +1854,7 @@
           <p:cNvPr id="8" name="Marcador de pie de página 7">
             <a:extLst>
               <a:ext uri="{FF2B5EF4-FFF2-40B4-BE49-F238E27FC236}">
-                <a16:creationId xmlns:a16="http://schemas.microsoft.com/office/drawing/2014/main" xmlns="" id="{71B657D1-4479-4DAA-A27D-75F0872E33AC}"/>
+                <a16:creationId xmlns="" xmlns:a16="http://schemas.microsoft.com/office/drawing/2014/main" id="{71B657D1-4479-4DAA-A27D-75F0872E33AC}"/>
               </a:ext>
             </a:extLst>
           </p:cNvPr>
@@ -1879,7 +1879,7 @@
           <p:cNvPr id="9" name="Marcador de número de diapositiva 8">
             <a:extLst>
               <a:ext uri="{FF2B5EF4-FFF2-40B4-BE49-F238E27FC236}">
-                <a16:creationId xmlns:a16="http://schemas.microsoft.com/office/drawing/2014/main" xmlns="" id="{72E44760-02D4-4C5D-83CF-6712A8290F9D}"/>
+                <a16:creationId xmlns="" xmlns:a16="http://schemas.microsoft.com/office/drawing/2014/main" id="{72E44760-02D4-4C5D-83CF-6712A8290F9D}"/>
               </a:ext>
             </a:extLst>
           </p:cNvPr>
@@ -1907,7 +1907,7 @@
     </p:spTree>
     <p:extLst>
       <p:ext uri="{BB962C8B-B14F-4D97-AF65-F5344CB8AC3E}">
-        <p14:creationId xmlns:p14="http://schemas.microsoft.com/office/powerpoint/2010/main" xmlns="" val="4187433897"/>
+        <p14:creationId xmlns="" xmlns:p14="http://schemas.microsoft.com/office/powerpoint/2010/main" val="4187433897"/>
       </p:ext>
     </p:extLst>
   </p:cSld>
@@ -1939,7 +1939,7 @@
           <p:cNvPr id="2" name="Título 1">
             <a:extLst>
               <a:ext uri="{FF2B5EF4-FFF2-40B4-BE49-F238E27FC236}">
-                <a16:creationId xmlns:a16="http://schemas.microsoft.com/office/drawing/2014/main" xmlns="" id="{6270498C-939A-497C-AF25-022EDE14FDF4}"/>
+                <a16:creationId xmlns="" xmlns:a16="http://schemas.microsoft.com/office/drawing/2014/main" id="{6270498C-939A-497C-AF25-022EDE14FDF4}"/>
               </a:ext>
             </a:extLst>
           </p:cNvPr>
@@ -1967,7 +1967,7 @@
           <p:cNvPr id="3" name="Marcador de fecha 2">
             <a:extLst>
               <a:ext uri="{FF2B5EF4-FFF2-40B4-BE49-F238E27FC236}">
-                <a16:creationId xmlns:a16="http://schemas.microsoft.com/office/drawing/2014/main" xmlns="" id="{38BD6F06-A827-4D38-A1D9-D7BF5373DAD4}"/>
+                <a16:creationId xmlns="" xmlns:a16="http://schemas.microsoft.com/office/drawing/2014/main" id="{38BD6F06-A827-4D38-A1D9-D7BF5373DAD4}"/>
               </a:ext>
             </a:extLst>
           </p:cNvPr>
@@ -1986,7 +1986,7 @@
             <a:fld id="{EFBC5A1B-75D9-4BC9-8C41-860857045191}" type="datetimeFigureOut">
               <a:rPr lang="es-ES" smtClean="0"/>
               <a:pPr/>
-              <a:t>20/11/2022</a:t>
+              <a:t>15/12/2022</a:t>
             </a:fld>
             <a:endParaRPr lang="es-ES"/>
           </a:p>
@@ -1997,7 +1997,7 @@
           <p:cNvPr id="4" name="Marcador de pie de página 3">
             <a:extLst>
               <a:ext uri="{FF2B5EF4-FFF2-40B4-BE49-F238E27FC236}">
-                <a16:creationId xmlns:a16="http://schemas.microsoft.com/office/drawing/2014/main" xmlns="" id="{3F2DAFBA-2A4E-4070-8FD2-B6A0C9CD462C}"/>
+                <a16:creationId xmlns="" xmlns:a16="http://schemas.microsoft.com/office/drawing/2014/main" id="{3F2DAFBA-2A4E-4070-8FD2-B6A0C9CD462C}"/>
               </a:ext>
             </a:extLst>
           </p:cNvPr>
@@ -2022,7 +2022,7 @@
           <p:cNvPr id="5" name="Marcador de número de diapositiva 4">
             <a:extLst>
               <a:ext uri="{FF2B5EF4-FFF2-40B4-BE49-F238E27FC236}">
-                <a16:creationId xmlns:a16="http://schemas.microsoft.com/office/drawing/2014/main" xmlns="" id="{E3299BBA-08D4-4CE8-8C03-024C7A0AB49C}"/>
+                <a16:creationId xmlns="" xmlns:a16="http://schemas.microsoft.com/office/drawing/2014/main" id="{E3299BBA-08D4-4CE8-8C03-024C7A0AB49C}"/>
               </a:ext>
             </a:extLst>
           </p:cNvPr>
@@ -2050,7 +2050,7 @@
     </p:spTree>
     <p:extLst>
       <p:ext uri="{BB962C8B-B14F-4D97-AF65-F5344CB8AC3E}">
-        <p14:creationId xmlns:p14="http://schemas.microsoft.com/office/powerpoint/2010/main" xmlns="" val="1211332172"/>
+        <p14:creationId xmlns="" xmlns:p14="http://schemas.microsoft.com/office/powerpoint/2010/main" val="1211332172"/>
       </p:ext>
     </p:extLst>
   </p:cSld>
@@ -2082,7 +2082,7 @@
           <p:cNvPr id="2" name="Marcador de fecha 1">
             <a:extLst>
               <a:ext uri="{FF2B5EF4-FFF2-40B4-BE49-F238E27FC236}">
-                <a16:creationId xmlns:a16="http://schemas.microsoft.com/office/drawing/2014/main" xmlns="" id="{B2784211-5E54-4766-8B46-12C57FCBC2B6}"/>
+                <a16:creationId xmlns="" xmlns:a16="http://schemas.microsoft.com/office/drawing/2014/main" id="{B2784211-5E54-4766-8B46-12C57FCBC2B6}"/>
               </a:ext>
             </a:extLst>
           </p:cNvPr>
@@ -2101,7 +2101,7 @@
             <a:fld id="{EFBC5A1B-75D9-4BC9-8C41-860857045191}" type="datetimeFigureOut">
               <a:rPr lang="es-ES" smtClean="0"/>
               <a:pPr/>
-              <a:t>20/11/2022</a:t>
+              <a:t>15/12/2022</a:t>
             </a:fld>
             <a:endParaRPr lang="es-ES"/>
           </a:p>
@@ -2112,7 +2112,7 @@
           <p:cNvPr id="3" name="Marcador de pie de página 2">
             <a:extLst>
               <a:ext uri="{FF2B5EF4-FFF2-40B4-BE49-F238E27FC236}">
-                <a16:creationId xmlns:a16="http://schemas.microsoft.com/office/drawing/2014/main" xmlns="" id="{92520B57-CC9A-4071-8120-E857E89EDEB8}"/>
+                <a16:creationId xmlns="" xmlns:a16="http://schemas.microsoft.com/office/drawing/2014/main" id="{92520B57-CC9A-4071-8120-E857E89EDEB8}"/>
               </a:ext>
             </a:extLst>
           </p:cNvPr>
@@ -2137,7 +2137,7 @@
           <p:cNvPr id="4" name="Marcador de número de diapositiva 3">
             <a:extLst>
               <a:ext uri="{FF2B5EF4-FFF2-40B4-BE49-F238E27FC236}">
-                <a16:creationId xmlns:a16="http://schemas.microsoft.com/office/drawing/2014/main" xmlns="" id="{8787466D-3F3F-4F9A-B628-C2FA36CE4FE2}"/>
+                <a16:creationId xmlns="" xmlns:a16="http://schemas.microsoft.com/office/drawing/2014/main" id="{8787466D-3F3F-4F9A-B628-C2FA36CE4FE2}"/>
               </a:ext>
             </a:extLst>
           </p:cNvPr>
@@ -2165,7 +2165,7 @@
     </p:spTree>
     <p:extLst>
       <p:ext uri="{BB962C8B-B14F-4D97-AF65-F5344CB8AC3E}">
-        <p14:creationId xmlns:p14="http://schemas.microsoft.com/office/powerpoint/2010/main" xmlns="" val="2413498818"/>
+        <p14:creationId xmlns="" xmlns:p14="http://schemas.microsoft.com/office/powerpoint/2010/main" val="2413498818"/>
       </p:ext>
     </p:extLst>
   </p:cSld>
@@ -2197,7 +2197,7 @@
           <p:cNvPr id="2" name="Título 1">
             <a:extLst>
               <a:ext uri="{FF2B5EF4-FFF2-40B4-BE49-F238E27FC236}">
-                <a16:creationId xmlns:a16="http://schemas.microsoft.com/office/drawing/2014/main" xmlns="" id="{44E3FDF0-D5CD-4C55-83E1-A554A3F3F591}"/>
+                <a16:creationId xmlns="" xmlns:a16="http://schemas.microsoft.com/office/drawing/2014/main" id="{44E3FDF0-D5CD-4C55-83E1-A554A3F3F591}"/>
               </a:ext>
             </a:extLst>
           </p:cNvPr>
@@ -2234,7 +2234,7 @@
           <p:cNvPr id="3" name="Marcador de contenido 2">
             <a:extLst>
               <a:ext uri="{FF2B5EF4-FFF2-40B4-BE49-F238E27FC236}">
-                <a16:creationId xmlns:a16="http://schemas.microsoft.com/office/drawing/2014/main" xmlns="" id="{69135358-973E-4F29-858A-4C75727043F6}"/>
+                <a16:creationId xmlns="" xmlns:a16="http://schemas.microsoft.com/office/drawing/2014/main" id="{69135358-973E-4F29-858A-4C75727043F6}"/>
               </a:ext>
             </a:extLst>
           </p:cNvPr>
@@ -2324,7 +2324,7 @@
           <p:cNvPr id="4" name="Marcador de texto 3">
             <a:extLst>
               <a:ext uri="{FF2B5EF4-FFF2-40B4-BE49-F238E27FC236}">
-                <a16:creationId xmlns:a16="http://schemas.microsoft.com/office/drawing/2014/main" xmlns="" id="{F1FA2661-0462-4433-90DC-A12960285CEA}"/>
+                <a16:creationId xmlns="" xmlns:a16="http://schemas.microsoft.com/office/drawing/2014/main" id="{F1FA2661-0462-4433-90DC-A12960285CEA}"/>
               </a:ext>
             </a:extLst>
           </p:cNvPr>
@@ -2395,7 +2395,7 @@
           <p:cNvPr id="5" name="Marcador de fecha 4">
             <a:extLst>
               <a:ext uri="{FF2B5EF4-FFF2-40B4-BE49-F238E27FC236}">
-                <a16:creationId xmlns:a16="http://schemas.microsoft.com/office/drawing/2014/main" xmlns="" id="{49AD787B-F459-4052-B553-CF5A494DB782}"/>
+                <a16:creationId xmlns="" xmlns:a16="http://schemas.microsoft.com/office/drawing/2014/main" id="{49AD787B-F459-4052-B553-CF5A494DB782}"/>
               </a:ext>
             </a:extLst>
           </p:cNvPr>
@@ -2414,7 +2414,7 @@
             <a:fld id="{EFBC5A1B-75D9-4BC9-8C41-860857045191}" type="datetimeFigureOut">
               <a:rPr lang="es-ES" smtClean="0"/>
               <a:pPr/>
-              <a:t>20/11/2022</a:t>
+              <a:t>15/12/2022</a:t>
             </a:fld>
             <a:endParaRPr lang="es-ES"/>
           </a:p>
@@ -2425,7 +2425,7 @@
           <p:cNvPr id="6" name="Marcador de pie de página 5">
             <a:extLst>
               <a:ext uri="{FF2B5EF4-FFF2-40B4-BE49-F238E27FC236}">
-                <a16:creationId xmlns:a16="http://schemas.microsoft.com/office/drawing/2014/main" xmlns="" id="{382BE518-0B2A-4A03-AACE-B9DE17D076CB}"/>
+                <a16:creationId xmlns="" xmlns:a16="http://schemas.microsoft.com/office/drawing/2014/main" id="{382BE518-0B2A-4A03-AACE-B9DE17D076CB}"/>
               </a:ext>
             </a:extLst>
           </p:cNvPr>
@@ -2450,7 +2450,7 @@
           <p:cNvPr id="7" name="Marcador de número de diapositiva 6">
             <a:extLst>
               <a:ext uri="{FF2B5EF4-FFF2-40B4-BE49-F238E27FC236}">
-                <a16:creationId xmlns:a16="http://schemas.microsoft.com/office/drawing/2014/main" xmlns="" id="{3A808C19-9692-46CC-B81D-3AB421594BFD}"/>
+                <a16:creationId xmlns="" xmlns:a16="http://schemas.microsoft.com/office/drawing/2014/main" id="{3A808C19-9692-46CC-B81D-3AB421594BFD}"/>
               </a:ext>
             </a:extLst>
           </p:cNvPr>
@@ -2478,7 +2478,7 @@
     </p:spTree>
     <p:extLst>
       <p:ext uri="{BB962C8B-B14F-4D97-AF65-F5344CB8AC3E}">
-        <p14:creationId xmlns:p14="http://schemas.microsoft.com/office/powerpoint/2010/main" xmlns="" val="1899574245"/>
+        <p14:creationId xmlns="" xmlns:p14="http://schemas.microsoft.com/office/powerpoint/2010/main" val="1899574245"/>
       </p:ext>
     </p:extLst>
   </p:cSld>
@@ -2510,7 +2510,7 @@
           <p:cNvPr id="2" name="Título 1">
             <a:extLst>
               <a:ext uri="{FF2B5EF4-FFF2-40B4-BE49-F238E27FC236}">
-                <a16:creationId xmlns:a16="http://schemas.microsoft.com/office/drawing/2014/main" xmlns="" id="{5AD62FD5-B09C-4A87-8537-735604610918}"/>
+                <a16:creationId xmlns="" xmlns:a16="http://schemas.microsoft.com/office/drawing/2014/main" id="{5AD62FD5-B09C-4A87-8537-735604610918}"/>
               </a:ext>
             </a:extLst>
           </p:cNvPr>
@@ -2547,7 +2547,7 @@
           <p:cNvPr id="3" name="Marcador de posición de imagen 2">
             <a:extLst>
               <a:ext uri="{FF2B5EF4-FFF2-40B4-BE49-F238E27FC236}">
-                <a16:creationId xmlns:a16="http://schemas.microsoft.com/office/drawing/2014/main" xmlns="" id="{B3D90944-8F4E-47BC-BD69-8E893730E0D2}"/>
+                <a16:creationId xmlns="" xmlns:a16="http://schemas.microsoft.com/office/drawing/2014/main" id="{B3D90944-8F4E-47BC-BD69-8E893730E0D2}"/>
               </a:ext>
             </a:extLst>
           </p:cNvPr>
@@ -2614,7 +2614,7 @@
           <p:cNvPr id="4" name="Marcador de texto 3">
             <a:extLst>
               <a:ext uri="{FF2B5EF4-FFF2-40B4-BE49-F238E27FC236}">
-                <a16:creationId xmlns:a16="http://schemas.microsoft.com/office/drawing/2014/main" xmlns="" id="{094847E1-7783-460E-A2B7-D41F0DC2755F}"/>
+                <a16:creationId xmlns="" xmlns:a16="http://schemas.microsoft.com/office/drawing/2014/main" id="{094847E1-7783-460E-A2B7-D41F0DC2755F}"/>
               </a:ext>
             </a:extLst>
           </p:cNvPr>
@@ -2685,7 +2685,7 @@
           <p:cNvPr id="5" name="Marcador de fecha 4">
             <a:extLst>
               <a:ext uri="{FF2B5EF4-FFF2-40B4-BE49-F238E27FC236}">
-                <a16:creationId xmlns:a16="http://schemas.microsoft.com/office/drawing/2014/main" xmlns="" id="{28A8DEFC-7F7E-47C5-85E7-E75878DFD550}"/>
+                <a16:creationId xmlns="" xmlns:a16="http://schemas.microsoft.com/office/drawing/2014/main" id="{28A8DEFC-7F7E-47C5-85E7-E75878DFD550}"/>
               </a:ext>
             </a:extLst>
           </p:cNvPr>
@@ -2704,7 +2704,7 @@
             <a:fld id="{EFBC5A1B-75D9-4BC9-8C41-860857045191}" type="datetimeFigureOut">
               <a:rPr lang="es-ES" smtClean="0"/>
               <a:pPr/>
-              <a:t>20/11/2022</a:t>
+              <a:t>15/12/2022</a:t>
             </a:fld>
             <a:endParaRPr lang="es-ES"/>
           </a:p>
@@ -2715,7 +2715,7 @@
           <p:cNvPr id="6" name="Marcador de pie de página 5">
             <a:extLst>
               <a:ext uri="{FF2B5EF4-FFF2-40B4-BE49-F238E27FC236}">
-                <a16:creationId xmlns:a16="http://schemas.microsoft.com/office/drawing/2014/main" xmlns="" id="{6108570B-8B55-4DD4-ADE5-4F45C0073E55}"/>
+                <a16:creationId xmlns="" xmlns:a16="http://schemas.microsoft.com/office/drawing/2014/main" id="{6108570B-8B55-4DD4-ADE5-4F45C0073E55}"/>
               </a:ext>
             </a:extLst>
           </p:cNvPr>
@@ -2740,7 +2740,7 @@
           <p:cNvPr id="7" name="Marcador de número de diapositiva 6">
             <a:extLst>
               <a:ext uri="{FF2B5EF4-FFF2-40B4-BE49-F238E27FC236}">
-                <a16:creationId xmlns:a16="http://schemas.microsoft.com/office/drawing/2014/main" xmlns="" id="{46E94416-1E50-4C95-B4AF-F8B12D885D43}"/>
+                <a16:creationId xmlns="" xmlns:a16="http://schemas.microsoft.com/office/drawing/2014/main" id="{46E94416-1E50-4C95-B4AF-F8B12D885D43}"/>
               </a:ext>
             </a:extLst>
           </p:cNvPr>
@@ -2768,7 +2768,7 @@
     </p:spTree>
     <p:extLst>
       <p:ext uri="{BB962C8B-B14F-4D97-AF65-F5344CB8AC3E}">
-        <p14:creationId xmlns:p14="http://schemas.microsoft.com/office/powerpoint/2010/main" xmlns="" val="1689888809"/>
+        <p14:creationId xmlns="" xmlns:p14="http://schemas.microsoft.com/office/powerpoint/2010/main" val="1689888809"/>
       </p:ext>
     </p:extLst>
   </p:cSld>
@@ -2805,7 +2805,7 @@
           <p:cNvPr id="2" name="Marcador de título 1">
             <a:extLst>
               <a:ext uri="{FF2B5EF4-FFF2-40B4-BE49-F238E27FC236}">
-                <a16:creationId xmlns:a16="http://schemas.microsoft.com/office/drawing/2014/main" xmlns="" id="{1C4EA66B-8008-4E62-B470-D012372D9C54}"/>
+                <a16:creationId xmlns="" xmlns:a16="http://schemas.microsoft.com/office/drawing/2014/main" id="{1C4EA66B-8008-4E62-B470-D012372D9C54}"/>
               </a:ext>
             </a:extLst>
           </p:cNvPr>
@@ -2843,7 +2843,7 @@
           <p:cNvPr id="3" name="Marcador de texto 2">
             <a:extLst>
               <a:ext uri="{FF2B5EF4-FFF2-40B4-BE49-F238E27FC236}">
-                <a16:creationId xmlns:a16="http://schemas.microsoft.com/office/drawing/2014/main" xmlns="" id="{932AAA69-39C0-42B4-B0CB-603BEA360F90}"/>
+                <a16:creationId xmlns="" xmlns:a16="http://schemas.microsoft.com/office/drawing/2014/main" id="{932AAA69-39C0-42B4-B0CB-603BEA360F90}"/>
               </a:ext>
             </a:extLst>
           </p:cNvPr>
@@ -2910,7 +2910,7 @@
           <p:cNvPr id="4" name="Marcador de fecha 3">
             <a:extLst>
               <a:ext uri="{FF2B5EF4-FFF2-40B4-BE49-F238E27FC236}">
-                <a16:creationId xmlns:a16="http://schemas.microsoft.com/office/drawing/2014/main" xmlns="" id="{336B4845-2F33-4E2B-820D-DFDA0715031A}"/>
+                <a16:creationId xmlns="" xmlns:a16="http://schemas.microsoft.com/office/drawing/2014/main" id="{336B4845-2F33-4E2B-820D-DFDA0715031A}"/>
               </a:ext>
             </a:extLst>
           </p:cNvPr>
@@ -2947,7 +2947,7 @@
             <a:fld id="{EFBC5A1B-75D9-4BC9-8C41-860857045191}" type="datetimeFigureOut">
               <a:rPr lang="es-ES" smtClean="0"/>
               <a:pPr/>
-              <a:t>20/11/2022</a:t>
+              <a:t>15/12/2022</a:t>
             </a:fld>
             <a:endParaRPr lang="es-ES"/>
           </a:p>
@@ -2958,7 +2958,7 @@
           <p:cNvPr id="5" name="Marcador de pie de página 4">
             <a:extLst>
               <a:ext uri="{FF2B5EF4-FFF2-40B4-BE49-F238E27FC236}">
-                <a16:creationId xmlns:a16="http://schemas.microsoft.com/office/drawing/2014/main" xmlns="" id="{2377ABD5-FE97-43F4-9196-F24C9B97CADB}"/>
+                <a16:creationId xmlns="" xmlns:a16="http://schemas.microsoft.com/office/drawing/2014/main" id="{2377ABD5-FE97-43F4-9196-F24C9B97CADB}"/>
               </a:ext>
             </a:extLst>
           </p:cNvPr>
@@ -3001,7 +3001,7 @@
           <p:cNvPr id="6" name="Marcador de número de diapositiva 5">
             <a:extLst>
               <a:ext uri="{FF2B5EF4-FFF2-40B4-BE49-F238E27FC236}">
-                <a16:creationId xmlns:a16="http://schemas.microsoft.com/office/drawing/2014/main" xmlns="" id="{A20E76EC-D35B-45EB-B53D-F96C980103A1}"/>
+                <a16:creationId xmlns="" xmlns:a16="http://schemas.microsoft.com/office/drawing/2014/main" id="{A20E76EC-D35B-45EB-B53D-F96C980103A1}"/>
               </a:ext>
             </a:extLst>
           </p:cNvPr>
@@ -3047,7 +3047,7 @@
     </p:spTree>
     <p:extLst>
       <p:ext uri="{BB962C8B-B14F-4D97-AF65-F5344CB8AC3E}">
-        <p14:creationId xmlns:p14="http://schemas.microsoft.com/office/powerpoint/2010/main" xmlns="" val="3258147845"/>
+        <p14:creationId xmlns="" xmlns:p14="http://schemas.microsoft.com/office/powerpoint/2010/main" val="3258147845"/>
       </p:ext>
     </p:extLst>
   </p:cSld>
@@ -3380,7 +3380,7 @@
           <p:cNvPr id="27" name="CuadroTexto 26">
             <a:extLst>
               <a:ext uri="{FF2B5EF4-FFF2-40B4-BE49-F238E27FC236}">
-                <a16:creationId xmlns:a16="http://schemas.microsoft.com/office/drawing/2014/main" xmlns="" id="{91083145-8B20-4DC2-B0C8-80BA773F821D}"/>
+                <a16:creationId xmlns="" xmlns:a16="http://schemas.microsoft.com/office/drawing/2014/main" id="{91083145-8B20-4DC2-B0C8-80BA773F821D}"/>
               </a:ext>
             </a:extLst>
           </p:cNvPr>
@@ -3415,7 +3415,7 @@
           <p:cNvPr id="28" name="CuadroTexto 27">
             <a:extLst>
               <a:ext uri="{FF2B5EF4-FFF2-40B4-BE49-F238E27FC236}">
-                <a16:creationId xmlns:a16="http://schemas.microsoft.com/office/drawing/2014/main" xmlns="" id="{9BC4EDBC-C66C-4D35-B8F6-D0AF6921AE75}"/>
+                <a16:creationId xmlns="" xmlns:a16="http://schemas.microsoft.com/office/drawing/2014/main" id="{9BC4EDBC-C66C-4D35-B8F6-D0AF6921AE75}"/>
               </a:ext>
             </a:extLst>
           </p:cNvPr>
@@ -3450,7 +3450,7 @@
           <p:cNvPr id="33" name="17 Rectángulo redondeado">
             <a:extLst>
               <a:ext uri="{FF2B5EF4-FFF2-40B4-BE49-F238E27FC236}">
-                <a16:creationId xmlns:a16="http://schemas.microsoft.com/office/drawing/2014/main" xmlns="" id="{8F3B96F0-FFCD-4FEA-B461-D7A34C8072F4}"/>
+                <a16:creationId xmlns="" xmlns:a16="http://schemas.microsoft.com/office/drawing/2014/main" id="{8F3B96F0-FFCD-4FEA-B461-D7A34C8072F4}"/>
               </a:ext>
             </a:extLst>
           </p:cNvPr>
@@ -3507,7 +3507,7 @@
           <p:cNvPr id="43" name="29 Rectángulo redondeado">
             <a:extLst>
               <a:ext uri="{FF2B5EF4-FFF2-40B4-BE49-F238E27FC236}">
-                <a16:creationId xmlns:a16="http://schemas.microsoft.com/office/drawing/2014/main" xmlns="" id="{4FAB1564-3349-46FD-B549-B071A89FF9A1}"/>
+                <a16:creationId xmlns="" xmlns:a16="http://schemas.microsoft.com/office/drawing/2014/main" id="{4FAB1564-3349-46FD-B549-B071A89FF9A1}"/>
               </a:ext>
             </a:extLst>
           </p:cNvPr>
@@ -3564,7 +3564,7 @@
           <p:cNvPr id="44" name="24 Rectángulo redondeado">
             <a:extLst>
               <a:ext uri="{FF2B5EF4-FFF2-40B4-BE49-F238E27FC236}">
-                <a16:creationId xmlns:a16="http://schemas.microsoft.com/office/drawing/2014/main" xmlns="" id="{9BC53101-F1E5-4084-8AE2-31419AEFF918}"/>
+                <a16:creationId xmlns="" xmlns:a16="http://schemas.microsoft.com/office/drawing/2014/main" id="{9BC53101-F1E5-4084-8AE2-31419AEFF918}"/>
               </a:ext>
             </a:extLst>
           </p:cNvPr>
@@ -3626,7 +3626,7 @@
           <p:cNvPr id="45" name="Rectángulo: esquinas redondeadas 44">
             <a:extLst>
               <a:ext uri="{FF2B5EF4-FFF2-40B4-BE49-F238E27FC236}">
-                <a16:creationId xmlns:a16="http://schemas.microsoft.com/office/drawing/2014/main" xmlns="" id="{49F1DBF7-AD08-4AFA-85B8-84F292D2C132}"/>
+                <a16:creationId xmlns="" xmlns:a16="http://schemas.microsoft.com/office/drawing/2014/main" id="{49F1DBF7-AD08-4AFA-85B8-84F292D2C132}"/>
               </a:ext>
             </a:extLst>
           </p:cNvPr>
@@ -3702,7 +3702,7 @@
           <p:cNvPr id="46" name="24 Rectángulo redondeado">
             <a:extLst>
               <a:ext uri="{FF2B5EF4-FFF2-40B4-BE49-F238E27FC236}">
-                <a16:creationId xmlns:a16="http://schemas.microsoft.com/office/drawing/2014/main" xmlns="" id="{E8048C8F-65ED-423A-81BB-F9A03CDAD52C}"/>
+                <a16:creationId xmlns="" xmlns:a16="http://schemas.microsoft.com/office/drawing/2014/main" id="{E8048C8F-65ED-423A-81BB-F9A03CDAD52C}"/>
               </a:ext>
             </a:extLst>
           </p:cNvPr>
@@ -3759,7 +3759,7 @@
           <p:cNvPr id="47" name="24 Rectángulo redondeado">
             <a:extLst>
               <a:ext uri="{FF2B5EF4-FFF2-40B4-BE49-F238E27FC236}">
-                <a16:creationId xmlns:a16="http://schemas.microsoft.com/office/drawing/2014/main" xmlns="" id="{F73B65AD-B42B-4069-8B40-0C63F934B343}"/>
+                <a16:creationId xmlns="" xmlns:a16="http://schemas.microsoft.com/office/drawing/2014/main" id="{F73B65AD-B42B-4069-8B40-0C63F934B343}"/>
               </a:ext>
             </a:extLst>
           </p:cNvPr>
@@ -3821,7 +3821,7 @@
           <p:cNvPr id="48" name="Flecha: hacia abajo 47">
             <a:extLst>
               <a:ext uri="{FF2B5EF4-FFF2-40B4-BE49-F238E27FC236}">
-                <a16:creationId xmlns:a16="http://schemas.microsoft.com/office/drawing/2014/main" xmlns="" id="{FC7F44F4-AA5E-44C3-9DE7-E03F50B2B0DD}"/>
+                <a16:creationId xmlns="" xmlns:a16="http://schemas.microsoft.com/office/drawing/2014/main" id="{FC7F44F4-AA5E-44C3-9DE7-E03F50B2B0DD}"/>
               </a:ext>
             </a:extLst>
           </p:cNvPr>
@@ -3867,7 +3867,7 @@
           <p:cNvPr id="49" name="Flecha: hacia abajo 48">
             <a:extLst>
               <a:ext uri="{FF2B5EF4-FFF2-40B4-BE49-F238E27FC236}">
-                <a16:creationId xmlns:a16="http://schemas.microsoft.com/office/drawing/2014/main" xmlns="" id="{1F1FF216-8BC8-4817-98B7-22033CB7DAD9}"/>
+                <a16:creationId xmlns="" xmlns:a16="http://schemas.microsoft.com/office/drawing/2014/main" id="{1F1FF216-8BC8-4817-98B7-22033CB7DAD9}"/>
               </a:ext>
             </a:extLst>
           </p:cNvPr>
@@ -3913,7 +3913,7 @@
           <p:cNvPr id="50" name="Flecha: hacia abajo 49">
             <a:extLst>
               <a:ext uri="{FF2B5EF4-FFF2-40B4-BE49-F238E27FC236}">
-                <a16:creationId xmlns:a16="http://schemas.microsoft.com/office/drawing/2014/main" xmlns="" id="{90AE0CC3-D921-4BC2-BB8D-0E99ECF064A0}"/>
+                <a16:creationId xmlns="" xmlns:a16="http://schemas.microsoft.com/office/drawing/2014/main" id="{90AE0CC3-D921-4BC2-BB8D-0E99ECF064A0}"/>
               </a:ext>
             </a:extLst>
           </p:cNvPr>
@@ -3959,7 +3959,7 @@
           <p:cNvPr id="51" name="Flecha: a la derecha 50">
             <a:extLst>
               <a:ext uri="{FF2B5EF4-FFF2-40B4-BE49-F238E27FC236}">
-                <a16:creationId xmlns:a16="http://schemas.microsoft.com/office/drawing/2014/main" xmlns="" id="{D21169A9-6253-485D-B844-D60196093334}"/>
+                <a16:creationId xmlns="" xmlns:a16="http://schemas.microsoft.com/office/drawing/2014/main" id="{D21169A9-6253-485D-B844-D60196093334}"/>
               </a:ext>
             </a:extLst>
           </p:cNvPr>
@@ -4005,7 +4005,7 @@
           <p:cNvPr id="53" name="124 Conector recto de flecha">
             <a:extLst>
               <a:ext uri="{FF2B5EF4-FFF2-40B4-BE49-F238E27FC236}">
-                <a16:creationId xmlns:a16="http://schemas.microsoft.com/office/drawing/2014/main" xmlns="" id="{CB24B452-0240-42AD-AB50-081BD3CBEEB9}"/>
+                <a16:creationId xmlns="" xmlns:a16="http://schemas.microsoft.com/office/drawing/2014/main" id="{CB24B452-0240-42AD-AB50-081BD3CBEEB9}"/>
               </a:ext>
             </a:extLst>
           </p:cNvPr>
@@ -4049,7 +4049,7 @@
           <p:cNvPr id="54" name="124 Conector recto de flecha">
             <a:extLst>
               <a:ext uri="{FF2B5EF4-FFF2-40B4-BE49-F238E27FC236}">
-                <a16:creationId xmlns:a16="http://schemas.microsoft.com/office/drawing/2014/main" xmlns="" id="{2653F2FF-A340-4E65-AF57-F5B892D2AF3C}"/>
+                <a16:creationId xmlns="" xmlns:a16="http://schemas.microsoft.com/office/drawing/2014/main" id="{2653F2FF-A340-4E65-AF57-F5B892D2AF3C}"/>
               </a:ext>
             </a:extLst>
           </p:cNvPr>
@@ -4093,7 +4093,7 @@
           <p:cNvPr id="58" name="Flecha: a la izquierda y derecha 57">
             <a:extLst>
               <a:ext uri="{FF2B5EF4-FFF2-40B4-BE49-F238E27FC236}">
-                <a16:creationId xmlns:a16="http://schemas.microsoft.com/office/drawing/2014/main" xmlns="" id="{9D5C8EB9-71D8-4351-BB6D-4C80F62C8918}"/>
+                <a16:creationId xmlns="" xmlns:a16="http://schemas.microsoft.com/office/drawing/2014/main" id="{9D5C8EB9-71D8-4351-BB6D-4C80F62C8918}"/>
               </a:ext>
             </a:extLst>
           </p:cNvPr>
@@ -4139,7 +4139,7 @@
           <p:cNvPr id="59" name="CuadroTexto 58">
             <a:extLst>
               <a:ext uri="{FF2B5EF4-FFF2-40B4-BE49-F238E27FC236}">
-                <a16:creationId xmlns:a16="http://schemas.microsoft.com/office/drawing/2014/main" xmlns="" id="{5A1D2FEE-BC7E-4255-A037-95CCA5998751}"/>
+                <a16:creationId xmlns="" xmlns:a16="http://schemas.microsoft.com/office/drawing/2014/main" id="{5A1D2FEE-BC7E-4255-A037-95CCA5998751}"/>
               </a:ext>
             </a:extLst>
           </p:cNvPr>
@@ -4181,7 +4181,7 @@
           <p:cNvPr id="60" name="CuadroTexto 59">
             <a:extLst>
               <a:ext uri="{FF2B5EF4-FFF2-40B4-BE49-F238E27FC236}">
-                <a16:creationId xmlns:a16="http://schemas.microsoft.com/office/drawing/2014/main" xmlns="" id="{118416F3-97C4-4518-8F13-E57BA0098A37}"/>
+                <a16:creationId xmlns="" xmlns:a16="http://schemas.microsoft.com/office/drawing/2014/main" id="{118416F3-97C4-4518-8F13-E57BA0098A37}"/>
               </a:ext>
             </a:extLst>
           </p:cNvPr>
@@ -4224,7 +4224,7 @@
           <p:cNvPr id="61" name="CuadroTexto 60">
             <a:extLst>
               <a:ext uri="{FF2B5EF4-FFF2-40B4-BE49-F238E27FC236}">
-                <a16:creationId xmlns:a16="http://schemas.microsoft.com/office/drawing/2014/main" xmlns="" id="{6E0DFE7D-9BB5-437C-91D8-933A82AAFDE9}"/>
+                <a16:creationId xmlns="" xmlns:a16="http://schemas.microsoft.com/office/drawing/2014/main" id="{6E0DFE7D-9BB5-437C-91D8-933A82AAFDE9}"/>
               </a:ext>
             </a:extLst>
           </p:cNvPr>
@@ -4279,7 +4279,7 @@
           <p:cNvPr id="62" name="CuadroTexto 61">
             <a:extLst>
               <a:ext uri="{FF2B5EF4-FFF2-40B4-BE49-F238E27FC236}">
-                <a16:creationId xmlns:a16="http://schemas.microsoft.com/office/drawing/2014/main" xmlns="" id="{951A2C70-E705-4FA8-903D-F2EB33879676}"/>
+                <a16:creationId xmlns="" xmlns:a16="http://schemas.microsoft.com/office/drawing/2014/main" id="{951A2C70-E705-4FA8-903D-F2EB33879676}"/>
               </a:ext>
             </a:extLst>
           </p:cNvPr>
@@ -4320,7 +4320,7 @@
     </p:spTree>
     <p:extLst>
       <p:ext uri="{BB962C8B-B14F-4D97-AF65-F5344CB8AC3E}">
-        <p14:creationId xmlns:p14="http://schemas.microsoft.com/office/powerpoint/2010/main" xmlns="" val="3578574719"/>
+        <p14:creationId xmlns="" xmlns:p14="http://schemas.microsoft.com/office/powerpoint/2010/main" val="3578574719"/>
       </p:ext>
     </p:extLst>
   </p:cSld>
@@ -4362,7 +4362,7 @@
           <p:cNvPr id="27" name="CuadroTexto 26">
             <a:extLst>
               <a:ext uri="{FF2B5EF4-FFF2-40B4-BE49-F238E27FC236}">
-                <a16:creationId xmlns:a16="http://schemas.microsoft.com/office/drawing/2014/main" xmlns="" id="{91083145-8B20-4DC2-B0C8-80BA773F821D}"/>
+                <a16:creationId xmlns="" xmlns:a16="http://schemas.microsoft.com/office/drawing/2014/main" id="{91083145-8B20-4DC2-B0C8-80BA773F821D}"/>
               </a:ext>
             </a:extLst>
           </p:cNvPr>
@@ -4397,7 +4397,7 @@
           <p:cNvPr id="28" name="CuadroTexto 27">
             <a:extLst>
               <a:ext uri="{FF2B5EF4-FFF2-40B4-BE49-F238E27FC236}">
-                <a16:creationId xmlns:a16="http://schemas.microsoft.com/office/drawing/2014/main" xmlns="" id="{9BC4EDBC-C66C-4D35-B8F6-D0AF6921AE75}"/>
+                <a16:creationId xmlns="" xmlns:a16="http://schemas.microsoft.com/office/drawing/2014/main" id="{9BC4EDBC-C66C-4D35-B8F6-D0AF6921AE75}"/>
               </a:ext>
             </a:extLst>
           </p:cNvPr>
@@ -4432,7 +4432,7 @@
           <p:cNvPr id="33" name="17 Rectángulo redondeado">
             <a:extLst>
               <a:ext uri="{FF2B5EF4-FFF2-40B4-BE49-F238E27FC236}">
-                <a16:creationId xmlns:a16="http://schemas.microsoft.com/office/drawing/2014/main" xmlns="" id="{8F3B96F0-FFCD-4FEA-B461-D7A34C8072F4}"/>
+                <a16:creationId xmlns="" xmlns:a16="http://schemas.microsoft.com/office/drawing/2014/main" id="{8F3B96F0-FFCD-4FEA-B461-D7A34C8072F4}"/>
               </a:ext>
             </a:extLst>
           </p:cNvPr>
@@ -4489,7 +4489,7 @@
           <p:cNvPr id="43" name="29 Rectángulo redondeado">
             <a:extLst>
               <a:ext uri="{FF2B5EF4-FFF2-40B4-BE49-F238E27FC236}">
-                <a16:creationId xmlns:a16="http://schemas.microsoft.com/office/drawing/2014/main" xmlns="" id="{4FAB1564-3349-46FD-B549-B071A89FF9A1}"/>
+                <a16:creationId xmlns="" xmlns:a16="http://schemas.microsoft.com/office/drawing/2014/main" id="{4FAB1564-3349-46FD-B549-B071A89FF9A1}"/>
               </a:ext>
             </a:extLst>
           </p:cNvPr>
@@ -4546,7 +4546,7 @@
           <p:cNvPr id="44" name="24 Rectángulo redondeado">
             <a:extLst>
               <a:ext uri="{FF2B5EF4-FFF2-40B4-BE49-F238E27FC236}">
-                <a16:creationId xmlns:a16="http://schemas.microsoft.com/office/drawing/2014/main" xmlns="" id="{9BC53101-F1E5-4084-8AE2-31419AEFF918}"/>
+                <a16:creationId xmlns="" xmlns:a16="http://schemas.microsoft.com/office/drawing/2014/main" id="{9BC53101-F1E5-4084-8AE2-31419AEFF918}"/>
               </a:ext>
             </a:extLst>
           </p:cNvPr>
@@ -4608,7 +4608,7 @@
           <p:cNvPr id="45" name="Rectángulo: esquinas redondeadas 44">
             <a:extLst>
               <a:ext uri="{FF2B5EF4-FFF2-40B4-BE49-F238E27FC236}">
-                <a16:creationId xmlns:a16="http://schemas.microsoft.com/office/drawing/2014/main" xmlns="" id="{49F1DBF7-AD08-4AFA-85B8-84F292D2C132}"/>
+                <a16:creationId xmlns="" xmlns:a16="http://schemas.microsoft.com/office/drawing/2014/main" id="{49F1DBF7-AD08-4AFA-85B8-84F292D2C132}"/>
               </a:ext>
             </a:extLst>
           </p:cNvPr>
@@ -4663,7 +4663,7 @@
           <p:cNvPr id="46" name="24 Rectángulo redondeado">
             <a:extLst>
               <a:ext uri="{FF2B5EF4-FFF2-40B4-BE49-F238E27FC236}">
-                <a16:creationId xmlns:a16="http://schemas.microsoft.com/office/drawing/2014/main" xmlns="" id="{E8048C8F-65ED-423A-81BB-F9A03CDAD52C}"/>
+                <a16:creationId xmlns="" xmlns:a16="http://schemas.microsoft.com/office/drawing/2014/main" id="{E8048C8F-65ED-423A-81BB-F9A03CDAD52C}"/>
               </a:ext>
             </a:extLst>
           </p:cNvPr>
@@ -4720,7 +4720,7 @@
           <p:cNvPr id="47" name="24 Rectángulo redondeado">
             <a:extLst>
               <a:ext uri="{FF2B5EF4-FFF2-40B4-BE49-F238E27FC236}">
-                <a16:creationId xmlns:a16="http://schemas.microsoft.com/office/drawing/2014/main" xmlns="" id="{F73B65AD-B42B-4069-8B40-0C63F934B343}"/>
+                <a16:creationId xmlns="" xmlns:a16="http://schemas.microsoft.com/office/drawing/2014/main" id="{F73B65AD-B42B-4069-8B40-0C63F934B343}"/>
               </a:ext>
             </a:extLst>
           </p:cNvPr>
@@ -4782,7 +4782,7 @@
           <p:cNvPr id="48" name="Flecha: hacia abajo 47">
             <a:extLst>
               <a:ext uri="{FF2B5EF4-FFF2-40B4-BE49-F238E27FC236}">
-                <a16:creationId xmlns:a16="http://schemas.microsoft.com/office/drawing/2014/main" xmlns="" id="{FC7F44F4-AA5E-44C3-9DE7-E03F50B2B0DD}"/>
+                <a16:creationId xmlns="" xmlns:a16="http://schemas.microsoft.com/office/drawing/2014/main" id="{FC7F44F4-AA5E-44C3-9DE7-E03F50B2B0DD}"/>
               </a:ext>
             </a:extLst>
           </p:cNvPr>
@@ -4828,7 +4828,7 @@
           <p:cNvPr id="49" name="Flecha: hacia abajo 48">
             <a:extLst>
               <a:ext uri="{FF2B5EF4-FFF2-40B4-BE49-F238E27FC236}">
-                <a16:creationId xmlns:a16="http://schemas.microsoft.com/office/drawing/2014/main" xmlns="" id="{1F1FF216-8BC8-4817-98B7-22033CB7DAD9}"/>
+                <a16:creationId xmlns="" xmlns:a16="http://schemas.microsoft.com/office/drawing/2014/main" id="{1F1FF216-8BC8-4817-98B7-22033CB7DAD9}"/>
               </a:ext>
             </a:extLst>
           </p:cNvPr>
@@ -4874,7 +4874,7 @@
           <p:cNvPr id="50" name="Flecha: hacia abajo 49">
             <a:extLst>
               <a:ext uri="{FF2B5EF4-FFF2-40B4-BE49-F238E27FC236}">
-                <a16:creationId xmlns:a16="http://schemas.microsoft.com/office/drawing/2014/main" xmlns="" id="{90AE0CC3-D921-4BC2-BB8D-0E99ECF064A0}"/>
+                <a16:creationId xmlns="" xmlns:a16="http://schemas.microsoft.com/office/drawing/2014/main" id="{90AE0CC3-D921-4BC2-BB8D-0E99ECF064A0}"/>
               </a:ext>
             </a:extLst>
           </p:cNvPr>
@@ -4920,7 +4920,7 @@
           <p:cNvPr id="51" name="Flecha: a la derecha 50">
             <a:extLst>
               <a:ext uri="{FF2B5EF4-FFF2-40B4-BE49-F238E27FC236}">
-                <a16:creationId xmlns:a16="http://schemas.microsoft.com/office/drawing/2014/main" xmlns="" id="{D21169A9-6253-485D-B844-D60196093334}"/>
+                <a16:creationId xmlns="" xmlns:a16="http://schemas.microsoft.com/office/drawing/2014/main" id="{D21169A9-6253-485D-B844-D60196093334}"/>
               </a:ext>
             </a:extLst>
           </p:cNvPr>
@@ -4966,7 +4966,7 @@
           <p:cNvPr id="58" name="Flecha: a la izquierda y derecha 57">
             <a:extLst>
               <a:ext uri="{FF2B5EF4-FFF2-40B4-BE49-F238E27FC236}">
-                <a16:creationId xmlns:a16="http://schemas.microsoft.com/office/drawing/2014/main" xmlns="" id="{9D5C8EB9-71D8-4351-BB6D-4C80F62C8918}"/>
+                <a16:creationId xmlns="" xmlns:a16="http://schemas.microsoft.com/office/drawing/2014/main" id="{9D5C8EB9-71D8-4351-BB6D-4C80F62C8918}"/>
               </a:ext>
             </a:extLst>
           </p:cNvPr>
@@ -5012,7 +5012,7 @@
           <p:cNvPr id="59" name="CuadroTexto 58">
             <a:extLst>
               <a:ext uri="{FF2B5EF4-FFF2-40B4-BE49-F238E27FC236}">
-                <a16:creationId xmlns:a16="http://schemas.microsoft.com/office/drawing/2014/main" xmlns="" id="{5A1D2FEE-BC7E-4255-A037-95CCA5998751}"/>
+                <a16:creationId xmlns="" xmlns:a16="http://schemas.microsoft.com/office/drawing/2014/main" id="{5A1D2FEE-BC7E-4255-A037-95CCA5998751}"/>
               </a:ext>
             </a:extLst>
           </p:cNvPr>
@@ -5054,7 +5054,7 @@
           <p:cNvPr id="60" name="CuadroTexto 59">
             <a:extLst>
               <a:ext uri="{FF2B5EF4-FFF2-40B4-BE49-F238E27FC236}">
-                <a16:creationId xmlns:a16="http://schemas.microsoft.com/office/drawing/2014/main" xmlns="" id="{118416F3-97C4-4518-8F13-E57BA0098A37}"/>
+                <a16:creationId xmlns="" xmlns:a16="http://schemas.microsoft.com/office/drawing/2014/main" id="{118416F3-97C4-4518-8F13-E57BA0098A37}"/>
               </a:ext>
             </a:extLst>
           </p:cNvPr>
@@ -5097,7 +5097,7 @@
           <p:cNvPr id="61" name="CuadroTexto 60">
             <a:extLst>
               <a:ext uri="{FF2B5EF4-FFF2-40B4-BE49-F238E27FC236}">
-                <a16:creationId xmlns:a16="http://schemas.microsoft.com/office/drawing/2014/main" xmlns="" id="{6E0DFE7D-9BB5-437C-91D8-933A82AAFDE9}"/>
+                <a16:creationId xmlns="" xmlns:a16="http://schemas.microsoft.com/office/drawing/2014/main" id="{6E0DFE7D-9BB5-437C-91D8-933A82AAFDE9}"/>
               </a:ext>
             </a:extLst>
           </p:cNvPr>
@@ -5152,7 +5152,7 @@
           <p:cNvPr id="62" name="CuadroTexto 61">
             <a:extLst>
               <a:ext uri="{FF2B5EF4-FFF2-40B4-BE49-F238E27FC236}">
-                <a16:creationId xmlns:a16="http://schemas.microsoft.com/office/drawing/2014/main" xmlns="" id="{951A2C70-E705-4FA8-903D-F2EB33879676}"/>
+                <a16:creationId xmlns="" xmlns:a16="http://schemas.microsoft.com/office/drawing/2014/main" id="{951A2C70-E705-4FA8-903D-F2EB33879676}"/>
               </a:ext>
             </a:extLst>
           </p:cNvPr>
@@ -5195,7 +5195,7 @@
           <p:cNvPr id="26" name="23 Rectángulo redondeado">
             <a:extLst>
               <a:ext uri="{FF2B5EF4-FFF2-40B4-BE49-F238E27FC236}">
-                <a16:creationId xmlns:a16="http://schemas.microsoft.com/office/drawing/2014/main" xmlns="" id="{339722A7-A4C5-42DD-86B0-B19AB0712672}"/>
+                <a16:creationId xmlns="" xmlns:a16="http://schemas.microsoft.com/office/drawing/2014/main" id="{339722A7-A4C5-42DD-86B0-B19AB0712672}"/>
               </a:ext>
             </a:extLst>
           </p:cNvPr>
@@ -5256,7 +5256,7 @@
           <p:cNvPr id="29" name="25 Rectángulo redondeado">
             <a:extLst>
               <a:ext uri="{FF2B5EF4-FFF2-40B4-BE49-F238E27FC236}">
-                <a16:creationId xmlns:a16="http://schemas.microsoft.com/office/drawing/2014/main" xmlns="" id="{2EFE8F61-F52C-4394-892E-E8E1A8A71E80}"/>
+                <a16:creationId xmlns="" xmlns:a16="http://schemas.microsoft.com/office/drawing/2014/main" id="{2EFE8F61-F52C-4394-892E-E8E1A8A71E80}"/>
               </a:ext>
             </a:extLst>
           </p:cNvPr>
@@ -5317,7 +5317,7 @@
           <p:cNvPr id="30" name="27 Rectángulo redondeado">
             <a:extLst>
               <a:ext uri="{FF2B5EF4-FFF2-40B4-BE49-F238E27FC236}">
-                <a16:creationId xmlns:a16="http://schemas.microsoft.com/office/drawing/2014/main" xmlns="" id="{F807FDB9-C246-4CDB-8FD6-D4A4C68F022E}"/>
+                <a16:creationId xmlns="" xmlns:a16="http://schemas.microsoft.com/office/drawing/2014/main" id="{F807FDB9-C246-4CDB-8FD6-D4A4C68F022E}"/>
               </a:ext>
             </a:extLst>
           </p:cNvPr>
@@ -5378,7 +5378,7 @@
           <p:cNvPr id="36" name="6 Rectángulo redondeado">
             <a:extLst>
               <a:ext uri="{FF2B5EF4-FFF2-40B4-BE49-F238E27FC236}">
-                <a16:creationId xmlns:a16="http://schemas.microsoft.com/office/drawing/2014/main" xmlns="" id="{5AED2532-F822-470C-B2D7-1C691A111771}"/>
+                <a16:creationId xmlns="" xmlns:a16="http://schemas.microsoft.com/office/drawing/2014/main" id="{5AED2532-F822-470C-B2D7-1C691A111771}"/>
               </a:ext>
             </a:extLst>
           </p:cNvPr>
@@ -5440,7 +5440,7 @@
           <p:cNvPr id="38" name="23 Rectángulo redondeado">
             <a:extLst>
               <a:ext uri="{FF2B5EF4-FFF2-40B4-BE49-F238E27FC236}">
-                <a16:creationId xmlns:a16="http://schemas.microsoft.com/office/drawing/2014/main" xmlns="" id="{187143E1-E0A3-4016-8474-CD5193857D0B}"/>
+                <a16:creationId xmlns="" xmlns:a16="http://schemas.microsoft.com/office/drawing/2014/main" id="{187143E1-E0A3-4016-8474-CD5193857D0B}"/>
               </a:ext>
             </a:extLst>
           </p:cNvPr>
@@ -5486,13 +5486,18 @@
           <a:p>
             <a:pPr algn="ctr"/>
             <a:r>
-              <a:rPr lang="es-ES" sz="1400">
+              <a:rPr lang="es-ES" sz="1400" smtClean="0">
                 <a:solidFill>
                   <a:schemeClr val="bg1"/>
                 </a:solidFill>
               </a:rPr>
-              <a:t>Gamepad controller</a:t>
-            </a:r>
+              <a:t>Input controller</a:t>
+            </a:r>
+            <a:endParaRPr lang="es-ES" sz="1400">
+              <a:solidFill>
+                <a:schemeClr val="bg1"/>
+              </a:solidFill>
+            </a:endParaRPr>
           </a:p>
         </p:txBody>
       </p:sp>
@@ -5501,7 +5506,7 @@
           <p:cNvPr id="39" name="23 Rectángulo redondeado">
             <a:extLst>
               <a:ext uri="{FF2B5EF4-FFF2-40B4-BE49-F238E27FC236}">
-                <a16:creationId xmlns:a16="http://schemas.microsoft.com/office/drawing/2014/main" xmlns="" id="{300AE459-67F1-4F96-8E6C-13AC2B423A36}"/>
+                <a16:creationId xmlns="" xmlns:a16="http://schemas.microsoft.com/office/drawing/2014/main" id="{300AE459-67F1-4F96-8E6C-13AC2B423A36}"/>
               </a:ext>
             </a:extLst>
           </p:cNvPr>
@@ -5570,7 +5575,7 @@
           <p:cNvPr id="52" name="57 Rectángulo redondeado">
             <a:extLst>
               <a:ext uri="{FF2B5EF4-FFF2-40B4-BE49-F238E27FC236}">
-                <a16:creationId xmlns:a16="http://schemas.microsoft.com/office/drawing/2014/main" xmlns="" id="{8E08F4C7-53EF-4F2F-B946-F37593AC1F26}"/>
+                <a16:creationId xmlns="" xmlns:a16="http://schemas.microsoft.com/office/drawing/2014/main" id="{8E08F4C7-53EF-4F2F-B946-F37593AC1F26}"/>
               </a:ext>
             </a:extLst>
           </p:cNvPr>
@@ -5631,7 +5636,7 @@
           <p:cNvPr id="55" name="6 Rectángulo redondeado">
             <a:extLst>
               <a:ext uri="{FF2B5EF4-FFF2-40B4-BE49-F238E27FC236}">
-                <a16:creationId xmlns:a16="http://schemas.microsoft.com/office/drawing/2014/main" xmlns="" id="{ACCA5843-AEE3-47F1-B2C3-789C23ACED5F}"/>
+                <a16:creationId xmlns="" xmlns:a16="http://schemas.microsoft.com/office/drawing/2014/main" id="{ACCA5843-AEE3-47F1-B2C3-789C23ACED5F}"/>
               </a:ext>
             </a:extLst>
           </p:cNvPr>
@@ -5693,7 +5698,7 @@
           <p:cNvPr id="56" name="27 Rectángulo redondeado">
             <a:extLst>
               <a:ext uri="{FF2B5EF4-FFF2-40B4-BE49-F238E27FC236}">
-                <a16:creationId xmlns:a16="http://schemas.microsoft.com/office/drawing/2014/main" xmlns="" id="{6DB621EB-C72A-4585-86DD-509F9BB19740}"/>
+                <a16:creationId xmlns="" xmlns:a16="http://schemas.microsoft.com/office/drawing/2014/main" id="{6DB621EB-C72A-4585-86DD-509F9BB19740}"/>
               </a:ext>
             </a:extLst>
           </p:cNvPr>
@@ -5754,7 +5759,7 @@
           <p:cNvPr id="57" name="23 Rectángulo redondeado">
             <a:extLst>
               <a:ext uri="{FF2B5EF4-FFF2-40B4-BE49-F238E27FC236}">
-                <a16:creationId xmlns:a16="http://schemas.microsoft.com/office/drawing/2014/main" xmlns="" id="{286A1C29-2828-4310-B820-886797DB12A3}"/>
+                <a16:creationId xmlns="" xmlns:a16="http://schemas.microsoft.com/office/drawing/2014/main" id="{286A1C29-2828-4310-B820-886797DB12A3}"/>
               </a:ext>
             </a:extLst>
           </p:cNvPr>
@@ -5815,7 +5820,7 @@
           <p:cNvPr id="32" name="Rectángulo: esquinas redondeadas 31">
             <a:extLst>
               <a:ext uri="{FF2B5EF4-FFF2-40B4-BE49-F238E27FC236}">
-                <a16:creationId xmlns:a16="http://schemas.microsoft.com/office/drawing/2014/main" xmlns="" id="{D79842A1-BDC5-4268-9F41-9A1D6D23C720}"/>
+                <a16:creationId xmlns="" xmlns:a16="http://schemas.microsoft.com/office/drawing/2014/main" id="{D79842A1-BDC5-4268-9F41-9A1D6D23C720}"/>
               </a:ext>
             </a:extLst>
           </p:cNvPr>
@@ -5904,7 +5909,7 @@
           <p:cNvPr id="54" name="124 Conector recto de flecha">
             <a:extLst>
               <a:ext uri="{FF2B5EF4-FFF2-40B4-BE49-F238E27FC236}">
-                <a16:creationId xmlns:a16="http://schemas.microsoft.com/office/drawing/2014/main" xmlns="" id="{2653F2FF-A340-4E65-AF57-F5B892D2AF3C}"/>
+                <a16:creationId xmlns="" xmlns:a16="http://schemas.microsoft.com/office/drawing/2014/main" id="{2653F2FF-A340-4E65-AF57-F5B892D2AF3C}"/>
               </a:ext>
             </a:extLst>
           </p:cNvPr>
@@ -5948,7 +5953,7 @@
           <p:cNvPr id="41" name="124 Conector recto de flecha">
             <a:extLst>
               <a:ext uri="{FF2B5EF4-FFF2-40B4-BE49-F238E27FC236}">
-                <a16:creationId xmlns:a16="http://schemas.microsoft.com/office/drawing/2014/main" xmlns="" id="{62513997-4E73-4BFB-8EF8-59B7DA5B99DE}"/>
+                <a16:creationId xmlns="" xmlns:a16="http://schemas.microsoft.com/office/drawing/2014/main" id="{62513997-4E73-4BFB-8EF8-59B7DA5B99DE}"/>
               </a:ext>
             </a:extLst>
           </p:cNvPr>
@@ -5990,7 +5995,7 @@
     </p:spTree>
     <p:extLst>
       <p:ext uri="{BB962C8B-B14F-4D97-AF65-F5344CB8AC3E}">
-        <p14:creationId xmlns:p14="http://schemas.microsoft.com/office/powerpoint/2010/main" xmlns="" val="890748881"/>
+        <p14:creationId xmlns="" xmlns:p14="http://schemas.microsoft.com/office/powerpoint/2010/main" val="890748881"/>
       </p:ext>
     </p:extLst>
   </p:cSld>
@@ -6032,7 +6037,7 @@
           <p:cNvPr id="64" name="CuadroTexto 26">
             <a:extLst>
               <a:ext uri="{FF2B5EF4-FFF2-40B4-BE49-F238E27FC236}">
-                <a16:creationId xmlns:a16="http://schemas.microsoft.com/office/drawing/2014/main" xmlns="" id="{91083145-8B20-4DC2-B0C8-80BA773F821D}"/>
+                <a16:creationId xmlns="" xmlns:a16="http://schemas.microsoft.com/office/drawing/2014/main" id="{91083145-8B20-4DC2-B0C8-80BA773F821D}"/>
               </a:ext>
             </a:extLst>
           </p:cNvPr>
@@ -6068,7 +6073,7 @@
           <p:cNvPr id="65" name="CuadroTexto 27">
             <a:extLst>
               <a:ext uri="{FF2B5EF4-FFF2-40B4-BE49-F238E27FC236}">
-                <a16:creationId xmlns:a16="http://schemas.microsoft.com/office/drawing/2014/main" xmlns="" id="{9BC4EDBC-C66C-4D35-B8F6-D0AF6921AE75}"/>
+                <a16:creationId xmlns="" xmlns:a16="http://schemas.microsoft.com/office/drawing/2014/main" id="{9BC4EDBC-C66C-4D35-B8F6-D0AF6921AE75}"/>
               </a:ext>
             </a:extLst>
           </p:cNvPr>
@@ -6104,7 +6109,7 @@
           <p:cNvPr id="66" name="124 Conector recto de flecha">
             <a:extLst>
               <a:ext uri="{FF2B5EF4-FFF2-40B4-BE49-F238E27FC236}">
-                <a16:creationId xmlns:a16="http://schemas.microsoft.com/office/drawing/2014/main" xmlns="" id="{CB24B452-0240-42AD-AB50-081BD3CBEEB9}"/>
+                <a16:creationId xmlns="" xmlns:a16="http://schemas.microsoft.com/office/drawing/2014/main" id="{CB24B452-0240-42AD-AB50-081BD3CBEEB9}"/>
               </a:ext>
             </a:extLst>
           </p:cNvPr>
@@ -6148,7 +6153,7 @@
           <p:cNvPr id="68" name="124 Conector recto de flecha">
             <a:extLst>
               <a:ext uri="{FF2B5EF4-FFF2-40B4-BE49-F238E27FC236}">
-                <a16:creationId xmlns:a16="http://schemas.microsoft.com/office/drawing/2014/main" xmlns="" id="{CB24B452-0240-42AD-AB50-081BD3CBEEB9}"/>
+                <a16:creationId xmlns="" xmlns:a16="http://schemas.microsoft.com/office/drawing/2014/main" id="{CB24B452-0240-42AD-AB50-081BD3CBEEB9}"/>
               </a:ext>
             </a:extLst>
           </p:cNvPr>
@@ -6249,7 +6254,7 @@
           <p:cNvPr id="16" name="27 Rectángulo redondeado">
             <a:extLst>
               <a:ext uri="{FF2B5EF4-FFF2-40B4-BE49-F238E27FC236}">
-                <a16:creationId xmlns:a16="http://schemas.microsoft.com/office/drawing/2014/main" xmlns="" id="{F807FDB9-C246-4CDB-8FD6-D4A4C68F022E}"/>
+                <a16:creationId xmlns="" xmlns:a16="http://schemas.microsoft.com/office/drawing/2014/main" id="{F807FDB9-C246-4CDB-8FD6-D4A4C68F022E}"/>
               </a:ext>
             </a:extLst>
           </p:cNvPr>
@@ -6321,7 +6326,7 @@
           <p:cNvPr id="17" name="23 Rectángulo redondeado">
             <a:extLst>
               <a:ext uri="{FF2B5EF4-FFF2-40B4-BE49-F238E27FC236}">
-                <a16:creationId xmlns:a16="http://schemas.microsoft.com/office/drawing/2014/main" xmlns="" id="{286A1C29-2828-4310-B820-886797DB12A3}"/>
+                <a16:creationId xmlns="" xmlns:a16="http://schemas.microsoft.com/office/drawing/2014/main" id="{286A1C29-2828-4310-B820-886797DB12A3}"/>
               </a:ext>
             </a:extLst>
           </p:cNvPr>
@@ -6502,7 +6507,7 @@
           <p:cNvPr id="21" name="23 Rectángulo redondeado">
             <a:extLst>
               <a:ext uri="{FF2B5EF4-FFF2-40B4-BE49-F238E27FC236}">
-                <a16:creationId xmlns:a16="http://schemas.microsoft.com/office/drawing/2014/main" xmlns="" id="{286A1C29-2828-4310-B820-886797DB12A3}"/>
+                <a16:creationId xmlns="" xmlns:a16="http://schemas.microsoft.com/office/drawing/2014/main" id="{286A1C29-2828-4310-B820-886797DB12A3}"/>
               </a:ext>
             </a:extLst>
           </p:cNvPr>
@@ -6584,7 +6589,7 @@
           <p:cNvPr id="24" name="CuadroTexto 27">
             <a:extLst>
               <a:ext uri="{FF2B5EF4-FFF2-40B4-BE49-F238E27FC236}">
-                <a16:creationId xmlns:a16="http://schemas.microsoft.com/office/drawing/2014/main" xmlns="" id="{9BC4EDBC-C66C-4D35-B8F6-D0AF6921AE75}"/>
+                <a16:creationId xmlns="" xmlns:a16="http://schemas.microsoft.com/office/drawing/2014/main" id="{9BC4EDBC-C66C-4D35-B8F6-D0AF6921AE75}"/>
               </a:ext>
             </a:extLst>
           </p:cNvPr>
@@ -6620,7 +6625,7 @@
           <p:cNvPr id="25" name="24 Rectángulo redondeado">
             <a:extLst>
               <a:ext uri="{FF2B5EF4-FFF2-40B4-BE49-F238E27FC236}">
-                <a16:creationId xmlns:a16="http://schemas.microsoft.com/office/drawing/2014/main" xmlns="" id="{286A1C29-2828-4310-B820-886797DB12A3}"/>
+                <a16:creationId xmlns="" xmlns:a16="http://schemas.microsoft.com/office/drawing/2014/main" id="{286A1C29-2828-4310-B820-886797DB12A3}"/>
               </a:ext>
             </a:extLst>
           </p:cNvPr>
@@ -6702,7 +6707,7 @@
           <p:cNvPr id="15" name="27 Rectángulo redondeado">
             <a:extLst>
               <a:ext uri="{FF2B5EF4-FFF2-40B4-BE49-F238E27FC236}">
-                <a16:creationId xmlns:a16="http://schemas.microsoft.com/office/drawing/2014/main" xmlns="" id="{F807FDB9-C246-4CDB-8FD6-D4A4C68F022E}"/>
+                <a16:creationId xmlns="" xmlns:a16="http://schemas.microsoft.com/office/drawing/2014/main" id="{F807FDB9-C246-4CDB-8FD6-D4A4C68F022E}"/>
               </a:ext>
             </a:extLst>
           </p:cNvPr>
@@ -6768,7 +6773,7 @@
           <p:cNvPr id="22" name="CuadroTexto 27">
             <a:extLst>
               <a:ext uri="{FF2B5EF4-FFF2-40B4-BE49-F238E27FC236}">
-                <a16:creationId xmlns:a16="http://schemas.microsoft.com/office/drawing/2014/main" xmlns="" id="{9BC4EDBC-C66C-4D35-B8F6-D0AF6921AE75}"/>
+                <a16:creationId xmlns="" xmlns:a16="http://schemas.microsoft.com/office/drawing/2014/main" id="{9BC4EDBC-C66C-4D35-B8F6-D0AF6921AE75}"/>
               </a:ext>
             </a:extLst>
           </p:cNvPr>
@@ -6861,7 +6866,7 @@
           <p:cNvPr id="28" name="124 Conector recto de flecha">
             <a:extLst>
               <a:ext uri="{FF2B5EF4-FFF2-40B4-BE49-F238E27FC236}">
-                <a16:creationId xmlns:a16="http://schemas.microsoft.com/office/drawing/2014/main" xmlns="" id="{CB24B452-0240-42AD-AB50-081BD3CBEEB9}"/>
+                <a16:creationId xmlns="" xmlns:a16="http://schemas.microsoft.com/office/drawing/2014/main" id="{CB24B452-0240-42AD-AB50-081BD3CBEEB9}"/>
               </a:ext>
             </a:extLst>
           </p:cNvPr>
@@ -6906,7 +6911,7 @@
           <p:cNvPr id="30" name="23 Rectángulo redondeado">
             <a:extLst>
               <a:ext uri="{FF2B5EF4-FFF2-40B4-BE49-F238E27FC236}">
-                <a16:creationId xmlns:a16="http://schemas.microsoft.com/office/drawing/2014/main" xmlns="" id="{286A1C29-2828-4310-B820-886797DB12A3}"/>
+                <a16:creationId xmlns="" xmlns:a16="http://schemas.microsoft.com/office/drawing/2014/main" id="{286A1C29-2828-4310-B820-886797DB12A3}"/>
               </a:ext>
             </a:extLst>
           </p:cNvPr>
@@ -6972,7 +6977,7 @@
           <p:cNvPr id="33" name="124 Conector recto de flecha">
             <a:extLst>
               <a:ext uri="{FF2B5EF4-FFF2-40B4-BE49-F238E27FC236}">
-                <a16:creationId xmlns:a16="http://schemas.microsoft.com/office/drawing/2014/main" xmlns="" id="{CB24B452-0240-42AD-AB50-081BD3CBEEB9}"/>
+                <a16:creationId xmlns="" xmlns:a16="http://schemas.microsoft.com/office/drawing/2014/main" id="{CB24B452-0240-42AD-AB50-081BD3CBEEB9}"/>
               </a:ext>
             </a:extLst>
           </p:cNvPr>
@@ -7018,7 +7023,7 @@
           <p:cNvPr id="35" name="CuadroTexto 27">
             <a:extLst>
               <a:ext uri="{FF2B5EF4-FFF2-40B4-BE49-F238E27FC236}">
-                <a16:creationId xmlns:a16="http://schemas.microsoft.com/office/drawing/2014/main" xmlns="" id="{9BC4EDBC-C66C-4D35-B8F6-D0AF6921AE75}"/>
+                <a16:creationId xmlns="" xmlns:a16="http://schemas.microsoft.com/office/drawing/2014/main" id="{9BC4EDBC-C66C-4D35-B8F6-D0AF6921AE75}"/>
               </a:ext>
             </a:extLst>
           </p:cNvPr>
@@ -7055,7 +7060,7 @@
           <p:cNvPr id="41" name="CuadroTexto 27">
             <a:extLst>
               <a:ext uri="{FF2B5EF4-FFF2-40B4-BE49-F238E27FC236}">
-                <a16:creationId xmlns:a16="http://schemas.microsoft.com/office/drawing/2014/main" xmlns="" id="{9BC4EDBC-C66C-4D35-B8F6-D0AF6921AE75}"/>
+                <a16:creationId xmlns="" xmlns:a16="http://schemas.microsoft.com/office/drawing/2014/main" id="{9BC4EDBC-C66C-4D35-B8F6-D0AF6921AE75}"/>
               </a:ext>
             </a:extLst>
           </p:cNvPr>
@@ -7103,7 +7108,7 @@
     </p:spTree>
     <p:extLst>
       <p:ext uri="{BB962C8B-B14F-4D97-AF65-F5344CB8AC3E}">
-        <p14:creationId xmlns:p14="http://schemas.microsoft.com/office/powerpoint/2010/main" xmlns="" val="890748881"/>
+        <p14:creationId xmlns="" xmlns:p14="http://schemas.microsoft.com/office/powerpoint/2010/main" val="890748881"/>
       </p:ext>
     </p:extLst>
   </p:cSld>
@@ -7146,7 +7151,7 @@
           <p:cNvPr id="30" name="27 Rectángulo redondeado">
             <a:extLst>
               <a:ext uri="{FF2B5EF4-FFF2-40B4-BE49-F238E27FC236}">
-                <a16:creationId xmlns:a16="http://schemas.microsoft.com/office/drawing/2014/main" xmlns="" id="{F807FDB9-C246-4CDB-8FD6-D4A4C68F022E}"/>
+                <a16:creationId xmlns="" xmlns:a16="http://schemas.microsoft.com/office/drawing/2014/main" id="{F807FDB9-C246-4CDB-8FD6-D4A4C68F022E}"/>
               </a:ext>
             </a:extLst>
           </p:cNvPr>
@@ -7207,7 +7212,7 @@
           <p:cNvPr id="39" name="23 Rectángulo redondeado">
             <a:extLst>
               <a:ext uri="{FF2B5EF4-FFF2-40B4-BE49-F238E27FC236}">
-                <a16:creationId xmlns:a16="http://schemas.microsoft.com/office/drawing/2014/main" xmlns="" id="{300AE459-67F1-4F96-8E6C-13AC2B423A36}"/>
+                <a16:creationId xmlns="" xmlns:a16="http://schemas.microsoft.com/office/drawing/2014/main" id="{300AE459-67F1-4F96-8E6C-13AC2B423A36}"/>
               </a:ext>
             </a:extLst>
           </p:cNvPr>
@@ -7281,7 +7286,7 @@
           <p:cNvPr id="57" name="23 Rectángulo redondeado">
             <a:extLst>
               <a:ext uri="{FF2B5EF4-FFF2-40B4-BE49-F238E27FC236}">
-                <a16:creationId xmlns:a16="http://schemas.microsoft.com/office/drawing/2014/main" xmlns="" id="{286A1C29-2828-4310-B820-886797DB12A3}"/>
+                <a16:creationId xmlns="" xmlns:a16="http://schemas.microsoft.com/office/drawing/2014/main" id="{286A1C29-2828-4310-B820-886797DB12A3}"/>
               </a:ext>
             </a:extLst>
           </p:cNvPr>
@@ -7355,7 +7360,7 @@
           <p:cNvPr id="64" name="CuadroTexto 26">
             <a:extLst>
               <a:ext uri="{FF2B5EF4-FFF2-40B4-BE49-F238E27FC236}">
-                <a16:creationId xmlns:a16="http://schemas.microsoft.com/office/drawing/2014/main" xmlns="" id="{91083145-8B20-4DC2-B0C8-80BA773F821D}"/>
+                <a16:creationId xmlns="" xmlns:a16="http://schemas.microsoft.com/office/drawing/2014/main" id="{91083145-8B20-4DC2-B0C8-80BA773F821D}"/>
               </a:ext>
             </a:extLst>
           </p:cNvPr>
@@ -7391,7 +7396,7 @@
           <p:cNvPr id="65" name="CuadroTexto 27">
             <a:extLst>
               <a:ext uri="{FF2B5EF4-FFF2-40B4-BE49-F238E27FC236}">
-                <a16:creationId xmlns:a16="http://schemas.microsoft.com/office/drawing/2014/main" xmlns="" id="{9BC4EDBC-C66C-4D35-B8F6-D0AF6921AE75}"/>
+                <a16:creationId xmlns="" xmlns:a16="http://schemas.microsoft.com/office/drawing/2014/main" id="{9BC4EDBC-C66C-4D35-B8F6-D0AF6921AE75}"/>
               </a:ext>
             </a:extLst>
           </p:cNvPr>
@@ -7427,7 +7432,7 @@
           <p:cNvPr id="66" name="124 Conector recto de flecha">
             <a:extLst>
               <a:ext uri="{FF2B5EF4-FFF2-40B4-BE49-F238E27FC236}">
-                <a16:creationId xmlns:a16="http://schemas.microsoft.com/office/drawing/2014/main" xmlns="" id="{CB24B452-0240-42AD-AB50-081BD3CBEEB9}"/>
+                <a16:creationId xmlns="" xmlns:a16="http://schemas.microsoft.com/office/drawing/2014/main" id="{CB24B452-0240-42AD-AB50-081BD3CBEEB9}"/>
               </a:ext>
             </a:extLst>
           </p:cNvPr>
@@ -7471,7 +7476,7 @@
           <p:cNvPr id="68" name="124 Conector recto de flecha">
             <a:extLst>
               <a:ext uri="{FF2B5EF4-FFF2-40B4-BE49-F238E27FC236}">
-                <a16:creationId xmlns:a16="http://schemas.microsoft.com/office/drawing/2014/main" xmlns="" id="{CB24B452-0240-42AD-AB50-081BD3CBEEB9}"/>
+                <a16:creationId xmlns="" xmlns:a16="http://schemas.microsoft.com/office/drawing/2014/main" id="{CB24B452-0240-42AD-AB50-081BD3CBEEB9}"/>
               </a:ext>
             </a:extLst>
           </p:cNvPr>
@@ -7712,7 +7717,7 @@
           <p:cNvPr id="22" name="6 Rectángulo redondeado">
             <a:extLst>
               <a:ext uri="{FF2B5EF4-FFF2-40B4-BE49-F238E27FC236}">
-                <a16:creationId xmlns:a16="http://schemas.microsoft.com/office/drawing/2014/main" xmlns="" id="{5AED2532-F822-470C-B2D7-1C691A111771}"/>
+                <a16:creationId xmlns="" xmlns:a16="http://schemas.microsoft.com/office/drawing/2014/main" id="{5AED2532-F822-470C-B2D7-1C691A111771}"/>
               </a:ext>
             </a:extLst>
           </p:cNvPr>
@@ -7774,7 +7779,7 @@
           <p:cNvPr id="23" name="6 Rectángulo redondeado">
             <a:extLst>
               <a:ext uri="{FF2B5EF4-FFF2-40B4-BE49-F238E27FC236}">
-                <a16:creationId xmlns:a16="http://schemas.microsoft.com/office/drawing/2014/main" xmlns="" id="{ACCA5843-AEE3-47F1-B2C3-789C23ACED5F}"/>
+                <a16:creationId xmlns="" xmlns:a16="http://schemas.microsoft.com/office/drawing/2014/main" id="{ACCA5843-AEE3-47F1-B2C3-789C23ACED5F}"/>
               </a:ext>
             </a:extLst>
           </p:cNvPr>
@@ -7834,7 +7839,7 @@
     </p:spTree>
     <p:extLst>
       <p:ext uri="{BB962C8B-B14F-4D97-AF65-F5344CB8AC3E}">
-        <p14:creationId xmlns:p14="http://schemas.microsoft.com/office/powerpoint/2010/main" xmlns="" val="890748881"/>
+        <p14:creationId xmlns="" xmlns:p14="http://schemas.microsoft.com/office/powerpoint/2010/main" val="890748881"/>
       </p:ext>
     </p:extLst>
   </p:cSld>
@@ -7877,7 +7882,7 @@
           <p:cNvPr id="26" name="23 Rectángulo redondeado">
             <a:extLst>
               <a:ext uri="{FF2B5EF4-FFF2-40B4-BE49-F238E27FC236}">
-                <a16:creationId xmlns:a16="http://schemas.microsoft.com/office/drawing/2014/main" xmlns="" id="{339722A7-A4C5-42DD-86B0-B19AB0712672}"/>
+                <a16:creationId xmlns="" xmlns:a16="http://schemas.microsoft.com/office/drawing/2014/main" id="{339722A7-A4C5-42DD-86B0-B19AB0712672}"/>
               </a:ext>
             </a:extLst>
           </p:cNvPr>
@@ -7938,7 +7943,7 @@
           <p:cNvPr id="29" name="25 Rectángulo redondeado">
             <a:extLst>
               <a:ext uri="{FF2B5EF4-FFF2-40B4-BE49-F238E27FC236}">
-                <a16:creationId xmlns:a16="http://schemas.microsoft.com/office/drawing/2014/main" xmlns="" id="{2EFE8F61-F52C-4394-892E-E8E1A8A71E80}"/>
+                <a16:creationId xmlns="" xmlns:a16="http://schemas.microsoft.com/office/drawing/2014/main" id="{2EFE8F61-F52C-4394-892E-E8E1A8A71E80}"/>
               </a:ext>
             </a:extLst>
           </p:cNvPr>
@@ -7999,7 +8004,7 @@
           <p:cNvPr id="30" name="27 Rectángulo redondeado">
             <a:extLst>
               <a:ext uri="{FF2B5EF4-FFF2-40B4-BE49-F238E27FC236}">
-                <a16:creationId xmlns:a16="http://schemas.microsoft.com/office/drawing/2014/main" xmlns="" id="{F807FDB9-C246-4CDB-8FD6-D4A4C68F022E}"/>
+                <a16:creationId xmlns="" xmlns:a16="http://schemas.microsoft.com/office/drawing/2014/main" id="{F807FDB9-C246-4CDB-8FD6-D4A4C68F022E}"/>
               </a:ext>
             </a:extLst>
           </p:cNvPr>
@@ -8060,7 +8065,7 @@
           <p:cNvPr id="38" name="23 Rectángulo redondeado">
             <a:extLst>
               <a:ext uri="{FF2B5EF4-FFF2-40B4-BE49-F238E27FC236}">
-                <a16:creationId xmlns:a16="http://schemas.microsoft.com/office/drawing/2014/main" xmlns="" id="{187143E1-E0A3-4016-8474-CD5193857D0B}"/>
+                <a16:creationId xmlns="" xmlns:a16="http://schemas.microsoft.com/office/drawing/2014/main" id="{187143E1-E0A3-4016-8474-CD5193857D0B}"/>
               </a:ext>
             </a:extLst>
           </p:cNvPr>
@@ -8106,20 +8111,20 @@
           <a:p>
             <a:pPr algn="ctr"/>
             <a:r>
-              <a:rPr lang="es-ES" sz="1400">
+              <a:rPr lang="es-ES" sz="1400" smtClean="0">
                 <a:solidFill>
                   <a:schemeClr val="bg1"/>
                 </a:solidFill>
               </a:rPr>
-              <a:t>Gamepad</a:t>
-            </a:r>
-            <a:r>
-              <a:rPr lang="es-ES" sz="1200">
+              <a:t>Input </a:t>
+            </a:r>
+            <a:r>
+              <a:rPr lang="es-ES" sz="1200" smtClean="0">
                 <a:solidFill>
                   <a:schemeClr val="bg1"/>
                 </a:solidFill>
               </a:rPr>
-              <a:t> controller</a:t>
+              <a:t>controller</a:t>
             </a:r>
             <a:endParaRPr lang="es-ES" sz="1400">
               <a:solidFill>
@@ -8134,7 +8139,7 @@
           <p:cNvPr id="39" name="23 Rectángulo redondeado">
             <a:extLst>
               <a:ext uri="{FF2B5EF4-FFF2-40B4-BE49-F238E27FC236}">
-                <a16:creationId xmlns:a16="http://schemas.microsoft.com/office/drawing/2014/main" xmlns="" id="{300AE459-67F1-4F96-8E6C-13AC2B423A36}"/>
+                <a16:creationId xmlns="" xmlns:a16="http://schemas.microsoft.com/office/drawing/2014/main" id="{300AE459-67F1-4F96-8E6C-13AC2B423A36}"/>
               </a:ext>
             </a:extLst>
           </p:cNvPr>
@@ -8208,7 +8213,7 @@
           <p:cNvPr id="52" name="57 Rectángulo redondeado">
             <a:extLst>
               <a:ext uri="{FF2B5EF4-FFF2-40B4-BE49-F238E27FC236}">
-                <a16:creationId xmlns:a16="http://schemas.microsoft.com/office/drawing/2014/main" xmlns="" id="{8E08F4C7-53EF-4F2F-B946-F37593AC1F26}"/>
+                <a16:creationId xmlns="" xmlns:a16="http://schemas.microsoft.com/office/drawing/2014/main" id="{8E08F4C7-53EF-4F2F-B946-F37593AC1F26}"/>
               </a:ext>
             </a:extLst>
           </p:cNvPr>
@@ -8269,7 +8274,7 @@
           <p:cNvPr id="56" name="27 Rectángulo redondeado">
             <a:extLst>
               <a:ext uri="{FF2B5EF4-FFF2-40B4-BE49-F238E27FC236}">
-                <a16:creationId xmlns:a16="http://schemas.microsoft.com/office/drawing/2014/main" xmlns="" id="{6DB621EB-C72A-4585-86DD-509F9BB19740}"/>
+                <a16:creationId xmlns="" xmlns:a16="http://schemas.microsoft.com/office/drawing/2014/main" id="{6DB621EB-C72A-4585-86DD-509F9BB19740}"/>
               </a:ext>
             </a:extLst>
           </p:cNvPr>
@@ -8330,7 +8335,7 @@
           <p:cNvPr id="57" name="23 Rectángulo redondeado">
             <a:extLst>
               <a:ext uri="{FF2B5EF4-FFF2-40B4-BE49-F238E27FC236}">
-                <a16:creationId xmlns:a16="http://schemas.microsoft.com/office/drawing/2014/main" xmlns="" id="{286A1C29-2828-4310-B820-886797DB12A3}"/>
+                <a16:creationId xmlns="" xmlns:a16="http://schemas.microsoft.com/office/drawing/2014/main" id="{286A1C29-2828-4310-B820-886797DB12A3}"/>
               </a:ext>
             </a:extLst>
           </p:cNvPr>
@@ -8404,7 +8409,7 @@
           <p:cNvPr id="64" name="CuadroTexto 26">
             <a:extLst>
               <a:ext uri="{FF2B5EF4-FFF2-40B4-BE49-F238E27FC236}">
-                <a16:creationId xmlns:a16="http://schemas.microsoft.com/office/drawing/2014/main" xmlns="" id="{91083145-8B20-4DC2-B0C8-80BA773F821D}"/>
+                <a16:creationId xmlns="" xmlns:a16="http://schemas.microsoft.com/office/drawing/2014/main" id="{91083145-8B20-4DC2-B0C8-80BA773F821D}"/>
               </a:ext>
             </a:extLst>
           </p:cNvPr>
@@ -8440,7 +8445,7 @@
           <p:cNvPr id="65" name="CuadroTexto 27">
             <a:extLst>
               <a:ext uri="{FF2B5EF4-FFF2-40B4-BE49-F238E27FC236}">
-                <a16:creationId xmlns:a16="http://schemas.microsoft.com/office/drawing/2014/main" xmlns="" id="{9BC4EDBC-C66C-4D35-B8F6-D0AF6921AE75}"/>
+                <a16:creationId xmlns="" xmlns:a16="http://schemas.microsoft.com/office/drawing/2014/main" id="{9BC4EDBC-C66C-4D35-B8F6-D0AF6921AE75}"/>
               </a:ext>
             </a:extLst>
           </p:cNvPr>
@@ -8476,7 +8481,7 @@
           <p:cNvPr id="66" name="124 Conector recto de flecha">
             <a:extLst>
               <a:ext uri="{FF2B5EF4-FFF2-40B4-BE49-F238E27FC236}">
-                <a16:creationId xmlns:a16="http://schemas.microsoft.com/office/drawing/2014/main" xmlns="" id="{CB24B452-0240-42AD-AB50-081BD3CBEEB9}"/>
+                <a16:creationId xmlns="" xmlns:a16="http://schemas.microsoft.com/office/drawing/2014/main" id="{CB24B452-0240-42AD-AB50-081BD3CBEEB9}"/>
               </a:ext>
             </a:extLst>
           </p:cNvPr>
@@ -8520,7 +8525,7 @@
           <p:cNvPr id="68" name="124 Conector recto de flecha">
             <a:extLst>
               <a:ext uri="{FF2B5EF4-FFF2-40B4-BE49-F238E27FC236}">
-                <a16:creationId xmlns:a16="http://schemas.microsoft.com/office/drawing/2014/main" xmlns="" id="{CB24B452-0240-42AD-AB50-081BD3CBEEB9}"/>
+                <a16:creationId xmlns="" xmlns:a16="http://schemas.microsoft.com/office/drawing/2014/main" id="{CB24B452-0240-42AD-AB50-081BD3CBEEB9}"/>
               </a:ext>
             </a:extLst>
           </p:cNvPr>
@@ -8860,7 +8865,7 @@
     </p:spTree>
     <p:extLst>
       <p:ext uri="{BB962C8B-B14F-4D97-AF65-F5344CB8AC3E}">
-        <p14:creationId xmlns:p14="http://schemas.microsoft.com/office/powerpoint/2010/main" xmlns="" val="890748881"/>
+        <p14:creationId xmlns="" xmlns:p14="http://schemas.microsoft.com/office/powerpoint/2010/main" val="890748881"/>
       </p:ext>
     </p:extLst>
   </p:cSld>
@@ -9160,7 +9165,7 @@
   <a:extraClrSchemeLst/>
   <a:extLst>
     <a:ext uri="{05A4C25C-085E-4340-85A3-A5531E510DB2}">
-      <thm15:themeFamily xmlns:thm15="http://schemas.microsoft.com/office/thememl/2012/main" xmlns="" name="Office Theme" id="{62F939B6-93AF-4DB8-9C6B-D6C7DFDC589F}" vid="{4A3C46E8-61CC-4603-A589-7422A47A8E4A}"/>
+      <thm15:themeFamily xmlns="" xmlns:thm15="http://schemas.microsoft.com/office/thememl/2012/main" name="Office Theme" id="{62F939B6-93AF-4DB8-9C6B-D6C7DFDC589F}" vid="{4A3C46E8-61CC-4603-A589-7422A47A8E4A}"/>
     </a:ext>
   </a:extLst>
 </a:theme>

</xml_diff>